<commit_message>
Initiral Check in PAAS Infrastructure Solution
Initiral Check in PAAS Infrastructure Solution
</commit_message>
<xml_diff>
--- a/documents/Azure_PCI_PaaS_Management_Reference_Architecture.pptx
+++ b/documents/Azure_PCI_PaaS_Management_Reference_Architecture.pptx
@@ -468,7 +468,6 @@
               <a:rPr lang="en-US"/>
               <a:t>Fifth level</a:t>
             </a:r>
-            <a:endParaRPr lang="en-US"/>
           </a:p>
         </p:txBody>
       </p:sp>
@@ -2883,14 +2882,14 @@
           </a:ln>
           <a:extLst>
             <a:ext uri="{909E8E84-426E-40dd-AFC4-6F175D3DCCD1}">
-              <a14:hiddenFill xmlns:a14="http://schemas.microsoft.com/office/drawing/2010/main" xmlns="">
+              <a14:hiddenFill xmlns="" xmlns:a14="http://schemas.microsoft.com/office/drawing/2010/main">
                 <a:solidFill>
                   <a:srgbClr val="FFFFFF"/>
                 </a:solidFill>
               </a14:hiddenFill>
             </a:ext>
             <a:ext uri="{91240B29-F687-4f45-9708-019B960494DF}">
-              <a14:hiddenLine xmlns:a14="http://schemas.microsoft.com/office/drawing/2010/main" xmlns="" w="9525">
+              <a14:hiddenLine xmlns="" xmlns:a14="http://schemas.microsoft.com/office/drawing/2010/main" w="9525">
                 <a:solidFill>
                   <a:srgbClr val="000000"/>
                 </a:solidFill>
@@ -4765,23 +4764,7 @@
                   <a:srgbClr val="FFFF00"/>
                 </a:solidFill>
               </a:rPr>
-              <a:t>Azure </a:t>
-            </a:r>
-            <a:r>
-              <a:rPr lang="en-US" sz="3600" dirty="0">
-                <a:solidFill>
-                  <a:srgbClr val="FFFF00"/>
-                </a:solidFill>
-              </a:rPr>
-              <a:t>PaaS </a:t>
-            </a:r>
-            <a:r>
-              <a:rPr lang="en-US" sz="3600" dirty="0">
-                <a:solidFill>
-                  <a:srgbClr val="FFFF00"/>
-                </a:solidFill>
-              </a:rPr>
-              <a:t>PCI Reference Architecture</a:t>
+              <a:t>Azure PaaS PCI Reference Architecture</a:t>
             </a:r>
           </a:p>
           <a:p>
@@ -5081,9 +5064,38 @@
           </a:p>
         </p:txBody>
       </p:sp>
+      <p:sp>
+        <p:nvSpPr>
+          <p:cNvPr id="10" name="TextBox 9"/>
+          <p:cNvSpPr txBox="1"/>
+          <p:nvPr/>
+        </p:nvSpPr>
+        <p:spPr>
+          <a:xfrm>
+            <a:off x="2460990" y="1797739"/>
+            <a:ext cx="1239519" cy="400110"/>
+          </a:xfrm>
+          <a:prstGeom prst="rect">
+            <a:avLst/>
+          </a:prstGeom>
+          <a:noFill/>
+        </p:spPr>
+        <p:txBody>
+          <a:bodyPr wrap="square" rtlCol="0">
+            <a:spAutoFit/>
+          </a:bodyPr>
+          <a:lstStyle/>
+          <a:p>
+            <a:r>
+              <a:rPr lang="en-US" sz="1000" dirty="0"/>
+              <a:t>App Service Environment</a:t>
+            </a:r>
+          </a:p>
+        </p:txBody>
+      </p:sp>
       <p:pic>
         <p:nvPicPr>
-          <p:cNvPr id="9" name="Picture 8"/>
+          <p:cNvPr id="11" name="Picture 10"/>
           <p:cNvPicPr>
             <a:picLocks noChangeAspect="1"/>
           </p:cNvPicPr>
@@ -5103,8 +5115,8 @@
         </p:blipFill>
         <p:spPr>
           <a:xfrm>
-            <a:off x="2621115" y="1187771"/>
-            <a:ext cx="538160" cy="538160"/>
+            <a:off x="3757989" y="1230795"/>
+            <a:ext cx="517145" cy="517145"/>
           </a:xfrm>
           <a:prstGeom prst="rect">
             <a:avLst/>
@@ -5113,14 +5125,14 @@
       </p:pic>
       <p:sp>
         <p:nvSpPr>
-          <p:cNvPr id="10" name="TextBox 9"/>
+          <p:cNvPr id="12" name="TextBox 11"/>
           <p:cNvSpPr txBox="1"/>
           <p:nvPr/>
         </p:nvSpPr>
         <p:spPr>
           <a:xfrm>
-            <a:off x="2518470" y="1799265"/>
-            <a:ext cx="1239519" cy="400110"/>
+            <a:off x="3479931" y="1829032"/>
+            <a:ext cx="1239519" cy="246221"/>
           </a:xfrm>
           <a:prstGeom prst="rect">
             <a:avLst/>
@@ -5135,14 +5147,14 @@
           <a:p>
             <a:r>
               <a:rPr lang="en-US" sz="1000" dirty="0"/>
-              <a:t>App Service Environment</a:t>
+              <a:t>OMS Log Analytics</a:t>
             </a:r>
           </a:p>
         </p:txBody>
       </p:sp>
       <p:pic>
         <p:nvPicPr>
-          <p:cNvPr id="11" name="Picture 10"/>
+          <p:cNvPr id="13" name="Picture 12"/>
           <p:cNvPicPr>
             <a:picLocks noChangeAspect="1"/>
           </p:cNvPicPr>
@@ -5162,7 +5174,7 @@
         </p:blipFill>
         <p:spPr>
           <a:xfrm>
-            <a:off x="3757989" y="1230795"/>
+            <a:off x="5079999" y="1245361"/>
             <a:ext cx="517145" cy="517145"/>
           </a:xfrm>
           <a:prstGeom prst="rect">
@@ -5172,13 +5184,13 @@
       </p:pic>
       <p:sp>
         <p:nvSpPr>
-          <p:cNvPr id="12" name="TextBox 11"/>
+          <p:cNvPr id="14" name="TextBox 13"/>
           <p:cNvSpPr txBox="1"/>
           <p:nvPr/>
         </p:nvSpPr>
         <p:spPr>
           <a:xfrm>
-            <a:off x="3479931" y="1829032"/>
+            <a:off x="4882894" y="1826978"/>
             <a:ext cx="1239519" cy="246221"/>
           </a:xfrm>
           <a:prstGeom prst="rect">
@@ -5194,14 +5206,14 @@
           <a:p>
             <a:r>
               <a:rPr lang="en-US" sz="1000" dirty="0"/>
-              <a:t>OMS Log Analytics</a:t>
+              <a:t>Azure Key Vault</a:t>
             </a:r>
           </a:p>
         </p:txBody>
       </p:sp>
       <p:pic>
         <p:nvPicPr>
-          <p:cNvPr id="13" name="Picture 12"/>
+          <p:cNvPr id="15" name="Picture 14"/>
           <p:cNvPicPr>
             <a:picLocks noChangeAspect="1"/>
           </p:cNvPicPr>
@@ -5221,8 +5233,8 @@
         </p:blipFill>
         <p:spPr>
           <a:xfrm>
-            <a:off x="5079999" y="1245361"/>
-            <a:ext cx="517145" cy="517145"/>
+            <a:off x="7809579" y="1242850"/>
+            <a:ext cx="560047" cy="560047"/>
           </a:xfrm>
           <a:prstGeom prst="rect">
             <a:avLst/>
@@ -5231,13 +5243,13 @@
       </p:pic>
       <p:sp>
         <p:nvSpPr>
-          <p:cNvPr id="14" name="TextBox 13"/>
+          <p:cNvPr id="16" name="TextBox 15"/>
           <p:cNvSpPr txBox="1"/>
           <p:nvPr/>
         </p:nvSpPr>
         <p:spPr>
           <a:xfrm>
-            <a:off x="4882894" y="1826978"/>
+            <a:off x="7666736" y="1812202"/>
             <a:ext cx="1239519" cy="246221"/>
           </a:xfrm>
           <a:prstGeom prst="rect">
@@ -5249,18 +5261,25 @@
           <a:bodyPr wrap="square" rtlCol="0">
             <a:spAutoFit/>
           </a:bodyPr>
-          <a:lstStyle/>
+          <a:lstStyle>
+            <a:defPPr>
+              <a:defRPr lang="en-US"/>
+            </a:defPPr>
+            <a:lvl1pPr>
+              <a:defRPr sz="1400"/>
+            </a:lvl1pPr>
+          </a:lstStyle>
           <a:p>
             <a:r>
               <a:rPr lang="en-US" sz="1000" dirty="0"/>
-              <a:t>Azure Key Vault</a:t>
+              <a:t>Azure SQL DB</a:t>
             </a:r>
           </a:p>
         </p:txBody>
       </p:sp>
       <p:pic>
         <p:nvPicPr>
-          <p:cNvPr id="15" name="Picture 14"/>
+          <p:cNvPr id="17" name="Picture 16"/>
           <p:cNvPicPr>
             <a:picLocks noChangeAspect="1"/>
           </p:cNvPicPr>
@@ -5280,8 +5299,8 @@
         </p:blipFill>
         <p:spPr>
           <a:xfrm>
-            <a:off x="7809579" y="1242850"/>
-            <a:ext cx="560047" cy="560047"/>
+            <a:off x="224251" y="2588834"/>
+            <a:ext cx="548895" cy="548895"/>
           </a:xfrm>
           <a:prstGeom prst="rect">
             <a:avLst/>
@@ -5290,13 +5309,13 @@
       </p:pic>
       <p:sp>
         <p:nvSpPr>
-          <p:cNvPr id="16" name="TextBox 15"/>
+          <p:cNvPr id="18" name="TextBox 17"/>
           <p:cNvSpPr txBox="1"/>
           <p:nvPr/>
         </p:nvSpPr>
         <p:spPr>
           <a:xfrm>
-            <a:off x="7666736" y="1812202"/>
+            <a:off x="-16255" y="3201420"/>
             <a:ext cx="1239519" cy="246221"/>
           </a:xfrm>
           <a:prstGeom prst="rect">
@@ -5319,14 +5338,14 @@
           <a:p>
             <a:r>
               <a:rPr lang="en-US" sz="1000" dirty="0"/>
-              <a:t>Azure SQL DB</a:t>
+              <a:t>Application Insights</a:t>
             </a:r>
           </a:p>
         </p:txBody>
       </p:sp>
       <p:pic>
         <p:nvPicPr>
-          <p:cNvPr id="17" name="Picture 16"/>
+          <p:cNvPr id="19" name="Picture 18"/>
           <p:cNvPicPr>
             <a:picLocks noChangeAspect="1"/>
           </p:cNvPicPr>
@@ -5346,7 +5365,7 @@
         </p:blipFill>
         <p:spPr>
           <a:xfrm>
-            <a:off x="224251" y="2588834"/>
+            <a:off x="1386585" y="2563998"/>
             <a:ext cx="548895" cy="548895"/>
           </a:xfrm>
           <a:prstGeom prst="rect">
@@ -5356,14 +5375,14 @@
       </p:pic>
       <p:sp>
         <p:nvSpPr>
-          <p:cNvPr id="18" name="TextBox 17"/>
+          <p:cNvPr id="20" name="TextBox 19"/>
           <p:cNvSpPr txBox="1"/>
           <p:nvPr/>
         </p:nvSpPr>
         <p:spPr>
           <a:xfrm>
-            <a:off x="-16255" y="3201420"/>
-            <a:ext cx="1239519" cy="246221"/>
+            <a:off x="1278951" y="3201420"/>
+            <a:ext cx="1239519" cy="400110"/>
           </a:xfrm>
           <a:prstGeom prst="rect">
             <a:avLst/>
@@ -5385,14 +5404,14 @@
           <a:p>
             <a:r>
               <a:rPr lang="en-US" sz="1000" dirty="0"/>
-              <a:t>Application Insights</a:t>
+              <a:t>Azure Security Center</a:t>
             </a:r>
           </a:p>
         </p:txBody>
       </p:sp>
       <p:pic>
         <p:nvPicPr>
-          <p:cNvPr id="19" name="Picture 18"/>
+          <p:cNvPr id="21" name="Picture 20"/>
           <p:cNvPicPr>
             <a:picLocks noChangeAspect="1"/>
           </p:cNvPicPr>
@@ -5412,7 +5431,7 @@
         </p:blipFill>
         <p:spPr>
           <a:xfrm>
-            <a:off x="1386585" y="2563998"/>
+            <a:off x="2604260" y="2556462"/>
             <a:ext cx="548895" cy="548895"/>
           </a:xfrm>
           <a:prstGeom prst="rect">
@@ -5422,14 +5441,14 @@
       </p:pic>
       <p:sp>
         <p:nvSpPr>
-          <p:cNvPr id="20" name="TextBox 19"/>
+          <p:cNvPr id="22" name="TextBox 21"/>
           <p:cNvSpPr txBox="1"/>
           <p:nvPr/>
         </p:nvSpPr>
         <p:spPr>
           <a:xfrm>
-            <a:off x="1278951" y="3201420"/>
-            <a:ext cx="1239519" cy="400110"/>
+            <a:off x="2432050" y="3201420"/>
+            <a:ext cx="1239519" cy="246221"/>
           </a:xfrm>
           <a:prstGeom prst="rect">
             <a:avLst/>
@@ -5451,14 +5470,14 @@
           <a:p>
             <a:r>
               <a:rPr lang="en-US" sz="1000" dirty="0"/>
-              <a:t>Azure Security Center</a:t>
+              <a:t>Azure Web App</a:t>
             </a:r>
           </a:p>
         </p:txBody>
       </p:sp>
       <p:pic>
         <p:nvPicPr>
-          <p:cNvPr id="21" name="Picture 20"/>
+          <p:cNvPr id="23" name="Picture 22"/>
           <p:cNvPicPr>
             <a:picLocks noChangeAspect="1"/>
           </p:cNvPicPr>
@@ -5478,7 +5497,7 @@
         </p:blipFill>
         <p:spPr>
           <a:xfrm>
-            <a:off x="2604260" y="2556462"/>
+            <a:off x="3697093" y="2569304"/>
             <a:ext cx="548895" cy="548895"/>
           </a:xfrm>
           <a:prstGeom prst="rect">
@@ -5488,13 +5507,13 @@
       </p:pic>
       <p:sp>
         <p:nvSpPr>
-          <p:cNvPr id="22" name="TextBox 21"/>
+          <p:cNvPr id="24" name="TextBox 23"/>
           <p:cNvSpPr txBox="1"/>
           <p:nvPr/>
         </p:nvSpPr>
         <p:spPr>
           <a:xfrm>
-            <a:off x="2432050" y="3201420"/>
+            <a:off x="3476147" y="3201420"/>
             <a:ext cx="1239519" cy="246221"/>
           </a:xfrm>
           <a:prstGeom prst="rect">
@@ -5517,14 +5536,14 @@
           <a:p>
             <a:r>
               <a:rPr lang="en-US" sz="1000" dirty="0"/>
-              <a:t>Azure Web App</a:t>
+              <a:t>Azure Automation</a:t>
             </a:r>
           </a:p>
         </p:txBody>
       </p:sp>
       <p:pic>
         <p:nvPicPr>
-          <p:cNvPr id="23" name="Picture 22"/>
+          <p:cNvPr id="25" name="Picture 24"/>
           <p:cNvPicPr>
             <a:picLocks noChangeAspect="1"/>
           </p:cNvPicPr>
@@ -5544,7 +5563,7 @@
         </p:blipFill>
         <p:spPr>
           <a:xfrm>
-            <a:off x="3697093" y="2569304"/>
+            <a:off x="4953758" y="2588833"/>
             <a:ext cx="548895" cy="548895"/>
           </a:xfrm>
           <a:prstGeom prst="rect">
@@ -5554,14 +5573,14 @@
       </p:pic>
       <p:sp>
         <p:nvSpPr>
-          <p:cNvPr id="24" name="TextBox 23"/>
+          <p:cNvPr id="26" name="TextBox 25"/>
           <p:cNvSpPr txBox="1"/>
           <p:nvPr/>
         </p:nvSpPr>
         <p:spPr>
           <a:xfrm>
-            <a:off x="3476147" y="3201420"/>
-            <a:ext cx="1239519" cy="246221"/>
+            <a:off x="4824668" y="3201420"/>
+            <a:ext cx="1239519" cy="400110"/>
           </a:xfrm>
           <a:prstGeom prst="rect">
             <a:avLst/>
@@ -5583,72 +5602,6 @@
           <a:p>
             <a:r>
               <a:rPr lang="en-US" sz="1000" dirty="0"/>
-              <a:t>Azure Automation</a:t>
-            </a:r>
-          </a:p>
-        </p:txBody>
-      </p:sp>
-      <p:pic>
-        <p:nvPicPr>
-          <p:cNvPr id="25" name="Picture 24"/>
-          <p:cNvPicPr>
-            <a:picLocks noChangeAspect="1"/>
-          </p:cNvPicPr>
-          <p:nvPr/>
-        </p:nvPicPr>
-        <p:blipFill>
-          <a:blip r:embed="rId12">
-            <a:extLst>
-              <a:ext uri="{28A0092B-C50C-407E-A947-70E740481C1C}">
-                <a14:useLocalDpi xmlns:a14="http://schemas.microsoft.com/office/drawing/2010/main" val="0"/>
-              </a:ext>
-            </a:extLst>
-          </a:blip>
-          <a:stretch>
-            <a:fillRect/>
-          </a:stretch>
-        </p:blipFill>
-        <p:spPr>
-          <a:xfrm>
-            <a:off x="4953758" y="2588833"/>
-            <a:ext cx="548895" cy="548895"/>
-          </a:xfrm>
-          <a:prstGeom prst="rect">
-            <a:avLst/>
-          </a:prstGeom>
-        </p:spPr>
-      </p:pic>
-      <p:sp>
-        <p:nvSpPr>
-          <p:cNvPr id="26" name="TextBox 25"/>
-          <p:cNvSpPr txBox="1"/>
-          <p:nvPr/>
-        </p:nvSpPr>
-        <p:spPr>
-          <a:xfrm>
-            <a:off x="4824668" y="3201420"/>
-            <a:ext cx="1239519" cy="400110"/>
-          </a:xfrm>
-          <a:prstGeom prst="rect">
-            <a:avLst/>
-          </a:prstGeom>
-          <a:noFill/>
-        </p:spPr>
-        <p:txBody>
-          <a:bodyPr wrap="square" rtlCol="0">
-            <a:spAutoFit/>
-          </a:bodyPr>
-          <a:lstStyle>
-            <a:defPPr>
-              <a:defRPr lang="en-US"/>
-            </a:defPPr>
-            <a:lvl1pPr>
-              <a:defRPr sz="1400"/>
-            </a:lvl1pPr>
-          </a:lstStyle>
-          <a:p>
-            <a:r>
-              <a:rPr lang="en-US" sz="1000" dirty="0"/>
               <a:t>Azure Automation Runbooks</a:t>
             </a:r>
           </a:p>
@@ -5663,7 +5616,7 @@
           <p:nvPr/>
         </p:nvPicPr>
         <p:blipFill>
-          <a:blip r:embed="rId13">
+          <a:blip r:embed="rId12">
             <a:duotone>
               <a:prstClr val="black"/>
               <a:schemeClr val="accent2">
@@ -5718,6 +5671,72 @@
       <p:pic>
         <p:nvPicPr>
           <p:cNvPr id="29" name="Picture 28"/>
+          <p:cNvPicPr>
+            <a:picLocks noChangeAspect="1"/>
+          </p:cNvPicPr>
+          <p:nvPr/>
+        </p:nvPicPr>
+        <p:blipFill>
+          <a:blip r:embed="rId13">
+            <a:extLst>
+              <a:ext uri="{28A0092B-C50C-407E-A947-70E740481C1C}">
+                <a14:useLocalDpi xmlns:a14="http://schemas.microsoft.com/office/drawing/2010/main" val="0"/>
+              </a:ext>
+            </a:extLst>
+          </a:blip>
+          <a:stretch>
+            <a:fillRect/>
+          </a:stretch>
+        </p:blipFill>
+        <p:spPr>
+          <a:xfrm>
+            <a:off x="7826315" y="2514900"/>
+            <a:ext cx="470130" cy="470130"/>
+          </a:xfrm>
+          <a:prstGeom prst="rect">
+            <a:avLst/>
+          </a:prstGeom>
+        </p:spPr>
+      </p:pic>
+      <p:sp>
+        <p:nvSpPr>
+          <p:cNvPr id="30" name="TextBox 29"/>
+          <p:cNvSpPr txBox="1"/>
+          <p:nvPr/>
+        </p:nvSpPr>
+        <p:spPr>
+          <a:xfrm>
+            <a:off x="7676685" y="3201420"/>
+            <a:ext cx="1239519" cy="400110"/>
+          </a:xfrm>
+          <a:prstGeom prst="rect">
+            <a:avLst/>
+          </a:prstGeom>
+          <a:noFill/>
+        </p:spPr>
+        <p:txBody>
+          <a:bodyPr wrap="square" rtlCol="0">
+            <a:spAutoFit/>
+          </a:bodyPr>
+          <a:lstStyle>
+            <a:defPPr>
+              <a:defRPr lang="en-US"/>
+            </a:defPPr>
+            <a:lvl1pPr>
+              <a:defRPr sz="1400"/>
+            </a:lvl1pPr>
+          </a:lstStyle>
+          <a:p>
+            <a:r>
+              <a:rPr lang="en-US" sz="1000" dirty="0"/>
+              <a:t>Azure Virtual Network</a:t>
+            </a:r>
+          </a:p>
+        </p:txBody>
+      </p:sp>
+      <p:pic>
+        <p:nvPicPr>
+          <p:cNvPr id="31" name="Picture 30"/>
           <p:cNvPicPr>
             <a:picLocks noChangeAspect="1"/>
           </p:cNvPicPr>
@@ -5737,7 +5756,7 @@
         </p:blipFill>
         <p:spPr>
           <a:xfrm>
-            <a:off x="7826315" y="2514900"/>
+            <a:off x="9040773" y="2549952"/>
             <a:ext cx="470130" cy="470130"/>
           </a:xfrm>
           <a:prstGeom prst="rect">
@@ -5747,13 +5766,13 @@
       </p:pic>
       <p:sp>
         <p:nvSpPr>
-          <p:cNvPr id="30" name="TextBox 29"/>
+          <p:cNvPr id="32" name="TextBox 31"/>
           <p:cNvSpPr txBox="1"/>
           <p:nvPr/>
         </p:nvSpPr>
         <p:spPr>
           <a:xfrm>
-            <a:off x="7676685" y="3201420"/>
+            <a:off x="8936726" y="3201420"/>
             <a:ext cx="1239519" cy="400110"/>
           </a:xfrm>
           <a:prstGeom prst="rect">
@@ -5776,14 +5795,14 @@
           <a:p>
             <a:r>
               <a:rPr lang="en-US" sz="1000" dirty="0"/>
-              <a:t>Azure Virtual Network</a:t>
+              <a:t>Azure Virtual Machine</a:t>
             </a:r>
           </a:p>
         </p:txBody>
       </p:sp>
       <p:pic>
         <p:nvPicPr>
-          <p:cNvPr id="31" name="Picture 30"/>
+          <p:cNvPr id="33" name="Picture 32"/>
           <p:cNvPicPr>
             <a:picLocks noChangeAspect="1"/>
           </p:cNvPicPr>
@@ -5803,8 +5822,8 @@
         </p:blipFill>
         <p:spPr>
           <a:xfrm>
-            <a:off x="9040773" y="2549952"/>
-            <a:ext cx="470130" cy="470130"/>
+            <a:off x="278059" y="3915042"/>
+            <a:ext cx="464620" cy="464620"/>
           </a:xfrm>
           <a:prstGeom prst="rect">
             <a:avLst/>
@@ -5813,14 +5832,14 @@
       </p:pic>
       <p:sp>
         <p:nvSpPr>
-          <p:cNvPr id="32" name="TextBox 31"/>
+          <p:cNvPr id="34" name="TextBox 33"/>
           <p:cNvSpPr txBox="1"/>
           <p:nvPr/>
         </p:nvSpPr>
         <p:spPr>
           <a:xfrm>
-            <a:off x="8936726" y="3201420"/>
-            <a:ext cx="1239519" cy="400110"/>
+            <a:off x="46873" y="4447580"/>
+            <a:ext cx="1113261" cy="553998"/>
           </a:xfrm>
           <a:prstGeom prst="rect">
             <a:avLst/>
@@ -5842,14 +5861,14 @@
           <a:p>
             <a:r>
               <a:rPr lang="en-US" sz="1000" dirty="0"/>
-              <a:t>Azure Virtual Machine</a:t>
+              <a:t>Azure Resource Group and Policies</a:t>
             </a:r>
           </a:p>
         </p:txBody>
       </p:sp>
       <p:pic>
         <p:nvPicPr>
-          <p:cNvPr id="33" name="Picture 32"/>
+          <p:cNvPr id="35" name="Picture 34"/>
           <p:cNvPicPr>
             <a:picLocks noChangeAspect="1"/>
           </p:cNvPicPr>
@@ -5869,8 +5888,8 @@
         </p:blipFill>
         <p:spPr>
           <a:xfrm>
-            <a:off x="278059" y="3915042"/>
-            <a:ext cx="464620" cy="464620"/>
+            <a:off x="1386585" y="3915042"/>
+            <a:ext cx="470130" cy="470130"/>
           </a:xfrm>
           <a:prstGeom prst="rect">
             <a:avLst/>
@@ -5879,14 +5898,14 @@
       </p:pic>
       <p:sp>
         <p:nvSpPr>
-          <p:cNvPr id="34" name="TextBox 33"/>
+          <p:cNvPr id="36" name="TextBox 35"/>
           <p:cNvSpPr txBox="1"/>
           <p:nvPr/>
         </p:nvSpPr>
         <p:spPr>
           <a:xfrm>
-            <a:off x="46873" y="4447580"/>
-            <a:ext cx="1113261" cy="553998"/>
+            <a:off x="1278951" y="4447580"/>
+            <a:ext cx="974755" cy="400110"/>
           </a:xfrm>
           <a:prstGeom prst="rect">
             <a:avLst/>
@@ -5908,14 +5927,14 @@
           <a:p>
             <a:r>
               <a:rPr lang="en-US" sz="1000" dirty="0"/>
-              <a:t>Azure Resource Group and Policies</a:t>
+              <a:t>Azure Blob Storage</a:t>
             </a:r>
           </a:p>
         </p:txBody>
       </p:sp>
       <p:pic>
         <p:nvPicPr>
-          <p:cNvPr id="35" name="Picture 34"/>
+          <p:cNvPr id="37" name="Picture 36"/>
           <p:cNvPicPr>
             <a:picLocks noChangeAspect="1"/>
           </p:cNvPicPr>
@@ -5935,8 +5954,8 @@
         </p:blipFill>
         <p:spPr>
           <a:xfrm>
-            <a:off x="1386585" y="3915042"/>
-            <a:ext cx="470130" cy="470130"/>
+            <a:off x="6451746" y="2556876"/>
+            <a:ext cx="580852" cy="580852"/>
           </a:xfrm>
           <a:prstGeom prst="rect">
             <a:avLst/>
@@ -5945,14 +5964,14 @@
       </p:pic>
       <p:sp>
         <p:nvSpPr>
-          <p:cNvPr id="36" name="TextBox 35"/>
+          <p:cNvPr id="38" name="TextBox 37"/>
           <p:cNvSpPr txBox="1"/>
           <p:nvPr/>
         </p:nvSpPr>
         <p:spPr>
           <a:xfrm>
-            <a:off x="1223264" y="4432130"/>
-            <a:ext cx="1677932" cy="246221"/>
+            <a:off x="6343340" y="3201420"/>
+            <a:ext cx="836799" cy="246221"/>
           </a:xfrm>
           <a:prstGeom prst="rect">
             <a:avLst/>
@@ -5974,14 +5993,14 @@
           <a:p>
             <a:r>
               <a:rPr lang="en-US" sz="1000" dirty="0"/>
-              <a:t>Azure Blob Storage</a:t>
+              <a:t>Azure DNS</a:t>
             </a:r>
           </a:p>
         </p:txBody>
       </p:sp>
       <p:pic>
         <p:nvPicPr>
-          <p:cNvPr id="37" name="Picture 36"/>
+          <p:cNvPr id="39" name="Picture 38"/>
           <p:cNvPicPr>
             <a:picLocks noChangeAspect="1"/>
           </p:cNvPicPr>
@@ -6001,8 +6020,8 @@
         </p:blipFill>
         <p:spPr>
           <a:xfrm>
-            <a:off x="6451746" y="2556876"/>
-            <a:ext cx="580852" cy="580852"/>
+            <a:off x="8972358" y="1242850"/>
+            <a:ext cx="584128" cy="584128"/>
           </a:xfrm>
           <a:prstGeom prst="rect">
             <a:avLst/>
@@ -6011,14 +6030,14 @@
       </p:pic>
       <p:sp>
         <p:nvSpPr>
-          <p:cNvPr id="38" name="TextBox 37"/>
+          <p:cNvPr id="40" name="TextBox 39"/>
           <p:cNvSpPr txBox="1"/>
           <p:nvPr/>
         </p:nvSpPr>
         <p:spPr>
           <a:xfrm>
-            <a:off x="6343340" y="3201420"/>
-            <a:ext cx="836799" cy="246221"/>
+            <a:off x="8726075" y="1803772"/>
+            <a:ext cx="1239519" cy="246221"/>
           </a:xfrm>
           <a:prstGeom prst="rect">
             <a:avLst/>
@@ -6040,14 +6059,14 @@
           <a:p>
             <a:r>
               <a:rPr lang="en-US" sz="1000" dirty="0"/>
-              <a:t>Azure DNS</a:t>
+              <a:t>Azure Load Balancer</a:t>
             </a:r>
           </a:p>
         </p:txBody>
       </p:sp>
       <p:pic>
         <p:nvPicPr>
-          <p:cNvPr id="39" name="Picture 38"/>
+          <p:cNvPr id="2" name="Picture 1"/>
           <p:cNvPicPr>
             <a:picLocks noChangeAspect="1"/>
           </p:cNvPicPr>
@@ -6067,8 +6086,8 @@
         </p:blipFill>
         <p:spPr>
           <a:xfrm>
-            <a:off x="8972358" y="1242850"/>
-            <a:ext cx="584128" cy="584128"/>
+            <a:off x="2589993" y="3915042"/>
+            <a:ext cx="617177" cy="617177"/>
           </a:xfrm>
           <a:prstGeom prst="rect">
             <a:avLst/>
@@ -6077,14 +6096,14 @@
       </p:pic>
       <p:sp>
         <p:nvSpPr>
-          <p:cNvPr id="40" name="TextBox 39"/>
+          <p:cNvPr id="41" name="TextBox 40"/>
           <p:cNvSpPr txBox="1"/>
           <p:nvPr/>
         </p:nvSpPr>
         <p:spPr>
           <a:xfrm>
-            <a:off x="8726075" y="1803772"/>
-            <a:ext cx="1239519" cy="246221"/>
+            <a:off x="2501392" y="4447580"/>
+            <a:ext cx="974755" cy="707886"/>
           </a:xfrm>
           <a:prstGeom prst="rect">
             <a:avLst/>
@@ -6106,11 +6125,41 @@
           <a:p>
             <a:r>
               <a:rPr lang="en-US" sz="1000" dirty="0"/>
-              <a:t>Azure Load Balancer</a:t>
-            </a:r>
-          </a:p>
-        </p:txBody>
-      </p:sp>
+              <a:t>Azure Active Directory access control (RBAC)</a:t>
+            </a:r>
+          </a:p>
+        </p:txBody>
+      </p:sp>
+      <p:pic>
+        <p:nvPicPr>
+          <p:cNvPr id="3" name="Picture 2"/>
+          <p:cNvPicPr>
+            <a:picLocks noChangeAspect="1"/>
+          </p:cNvPicPr>
+          <p:nvPr/>
+        </p:nvPicPr>
+        <p:blipFill>
+          <a:blip r:embed="rId20">
+            <a:extLst>
+              <a:ext uri="{28A0092B-C50C-407E-A947-70E740481C1C}">
+                <a14:useLocalDpi xmlns:a14="http://schemas.microsoft.com/office/drawing/2010/main" val="0"/>
+              </a:ext>
+            </a:extLst>
+          </a:blip>
+          <a:stretch>
+            <a:fillRect/>
+          </a:stretch>
+        </p:blipFill>
+        <p:spPr>
+          <a:xfrm>
+            <a:off x="2550978" y="1144402"/>
+            <a:ext cx="587251" cy="587251"/>
+          </a:xfrm>
+          <a:prstGeom prst="rect">
+            <a:avLst/>
+          </a:prstGeom>
+        </p:spPr>
+      </p:pic>
     </p:spTree>
     <p:extLst>
       <p:ext uri="{BB962C8B-B14F-4D97-AF65-F5344CB8AC3E}">

</xml_diff>

<commit_message>
Updating some documentation. Adding PCI DSS 3.2 mapping (draft)
</commit_message>
<xml_diff>
--- a/documents/Azure_PCI_PaaS_Management_Reference_Architecture.pptx
+++ b/documents/Azure_PCI_PaaS_Management_Reference_Architecture.pptx
@@ -208,7 +208,7 @@
           <a:p>
             <a:fld id="{8BAD32BC-9A36-444A-AC36-0834185C81D6}" type="datetimeFigureOut">
               <a:rPr lang="en-US" smtClean="0"/>
-              <a:t>1/30/2017</a:t>
+              <a:t>2/2/2017</a:t>
             </a:fld>
             <a:endParaRPr lang="en-US"/>
           </a:p>
@@ -373,7 +373,7 @@
           <a:p>
             <a:fld id="{9513AB20-DDA0-498D-8E7E-1827A09E602C}" type="datetimeFigureOut">
               <a:rPr lang="en-US" smtClean="0"/>
-              <a:t>1/30/2017</a:t>
+              <a:t>2/2/2017</a:t>
             </a:fld>
             <a:endParaRPr lang="en-US"/>
           </a:p>
@@ -2882,14 +2882,14 @@
           </a:ln>
           <a:extLst>
             <a:ext uri="{909E8E84-426E-40dd-AFC4-6F175D3DCCD1}">
-              <a14:hiddenFill xmlns="" xmlns:a14="http://schemas.microsoft.com/office/drawing/2010/main">
+              <a14:hiddenFill xmlns:a14="http://schemas.microsoft.com/office/drawing/2010/main" xmlns="">
                 <a:solidFill>
                   <a:srgbClr val="FFFFFF"/>
                 </a:solidFill>
               </a14:hiddenFill>
             </a:ext>
             <a:ext uri="{91240B29-F687-4f45-9708-019B960494DF}">
-              <a14:hiddenLine xmlns="" xmlns:a14="http://schemas.microsoft.com/office/drawing/2010/main" w="9525">
+              <a14:hiddenLine xmlns:a14="http://schemas.microsoft.com/office/drawing/2010/main" xmlns="" w="9525">
                 <a:solidFill>
                   <a:srgbClr val="000000"/>
                 </a:solidFill>
@@ -13001,7 +13001,7 @@
       </p:grpSpPr>
       <p:pic>
         <p:nvPicPr>
-          <p:cNvPr id="6" name="Picture 5"/>
+          <p:cNvPr id="3" name="Picture 2"/>
           <p:cNvPicPr>
             <a:picLocks noChangeAspect="1"/>
           </p:cNvPicPr>
@@ -13015,22 +13015,12 @@
         </p:blipFill>
         <p:spPr>
           <a:xfrm>
-            <a:off x="4733271" y="1266110"/>
-            <a:ext cx="4227849" cy="3970033"/>
-          </a:xfrm>
-          <a:prstGeom prst="rect">
-            <a:avLst/>
-          </a:prstGeom>
-          <a:ln>
-            <a:noFill/>
-          </a:ln>
-          <a:effectLst>
-            <a:outerShdw blurRad="292100" dist="139700" dir="2700000" algn="tl" rotWithShape="0">
-              <a:srgbClr val="333333">
-                <a:alpha val="65000"/>
-              </a:srgbClr>
-            </a:outerShdw>
-          </a:effectLst>
+            <a:off x="4890957" y="1116611"/>
+            <a:ext cx="4165600" cy="4191187"/>
+          </a:xfrm>
+          <a:prstGeom prst="rect">
+            <a:avLst/>
+          </a:prstGeom>
         </p:spPr>
       </p:pic>
       <p:sp>
@@ -13269,7 +13259,7 @@
         </p:blipFill>
         <p:spPr bwMode="auto">
           <a:xfrm>
-            <a:off x="5307470" y="2534414"/>
+            <a:off x="5269633" y="1885021"/>
             <a:ext cx="426294" cy="426294"/>
           </a:xfrm>
           <a:prstGeom prst="rect">
@@ -13347,7 +13337,7 @@
               <a:rPr lang="en-US" sz="1400" dirty="0">
                 <a:hlinkClick r:id="rId6"/>
               </a:rPr>
-              <a:t>azurepcisamples@avyanconsulting.com</a:t>
+              <a:t>azurecompliance@avyanconsulting.com</a:t>
             </a:r>
             <a:r>
               <a:rPr lang="en-US" sz="1400" dirty="0"/>

</xml_diff>

<commit_message>
Updating Github with latest bits
</commit_message>
<xml_diff>
--- a/documents/Azure_PCI_PaaS_Management_Reference_Architecture.pptx
+++ b/documents/Azure_PCI_PaaS_Management_Reference_Architecture.pptx
@@ -208,7 +208,7 @@
           <a:p>
             <a:fld id="{8BAD32BC-9A36-444A-AC36-0834185C81D6}" type="datetimeFigureOut">
               <a:rPr lang="en-US" smtClean="0"/>
-              <a:t>2/2/2017</a:t>
+              <a:t>2/3/2017</a:t>
             </a:fld>
             <a:endParaRPr lang="en-US"/>
           </a:p>
@@ -2882,14 +2882,14 @@
           </a:ln>
           <a:extLst>
             <a:ext uri="{909E8E84-426E-40dd-AFC4-6F175D3DCCD1}">
-              <a14:hiddenFill xmlns:a14="http://schemas.microsoft.com/office/drawing/2010/main" xmlns="">
+              <a14:hiddenFill xmlns="" xmlns:a14="http://schemas.microsoft.com/office/drawing/2010/main">
                 <a:solidFill>
                   <a:srgbClr val="FFFFFF"/>
                 </a:solidFill>
               </a14:hiddenFill>
             </a:ext>
             <a:ext uri="{91240B29-F687-4f45-9708-019B960494DF}">
-              <a14:hiddenLine xmlns:a14="http://schemas.microsoft.com/office/drawing/2010/main" xmlns="" w="9525">
+              <a14:hiddenLine xmlns="" xmlns:a14="http://schemas.microsoft.com/office/drawing/2010/main" w="9525">
                 <a:solidFill>
                   <a:srgbClr val="000000"/>
                 </a:solidFill>
@@ -12292,7 +12292,7 @@
           <p:nvPr>
             <p:extLst>
               <p:ext uri="{D42A27DB-BD31-4B8C-83A1-F6EECF244321}">
-                <p14:modId xmlns:p14="http://schemas.microsoft.com/office/powerpoint/2010/main" val="3212476861"/>
+                <p14:modId xmlns:p14="http://schemas.microsoft.com/office/powerpoint/2010/main" val="3177429196"/>
               </p:ext>
             </p:extLst>
           </p:nvPr>
@@ -12445,6 +12445,44 @@
                         <a:cs typeface="+mn-cs"/>
                       </a:endParaRPr>
                     </a:p>
+                    <a:p>
+                      <a:pPr marL="173038" indent="-173038" rtl="0">
+                        <a:buFont typeface="Arial" panose="020B0604020202020204" pitchFamily="34" charset="0"/>
+                        <a:buChar char="•"/>
+                      </a:pPr>
+                      <a:r>
+                        <a:rPr lang="en-US" sz="800" kern="1200" dirty="0" err="1">
+                          <a:solidFill>
+                            <a:srgbClr val="7F7F7F"/>
+                          </a:solidFill>
+                          <a:latin typeface="Calibri" panose="020F0502020204030204" pitchFamily="34" charset="0"/>
+                          <a:ea typeface="+mn-ea"/>
+                          <a:cs typeface="+mn-cs"/>
+                          <a:hlinkClick r:id="rId35"/>
+                        </a:rPr>
+                        <a:t>AutoShutDown</a:t>
+                      </a:r>
+                      <a:r>
+                        <a:rPr lang="en-US" sz="800" kern="1200" dirty="0">
+                          <a:solidFill>
+                            <a:srgbClr val="7F7F7F"/>
+                          </a:solidFill>
+                          <a:latin typeface="Calibri" panose="020F0502020204030204" pitchFamily="34" charset="0"/>
+                          <a:ea typeface="+mn-ea"/>
+                          <a:cs typeface="+mn-cs"/>
+                          <a:hlinkClick r:id="rId35"/>
+                        </a:rPr>
+                        <a:t> Policy</a:t>
+                      </a:r>
+                      <a:endParaRPr lang="en-US" sz="800" kern="1200" dirty="0">
+                        <a:solidFill>
+                          <a:srgbClr val="7F7F7F"/>
+                        </a:solidFill>
+                        <a:latin typeface="Calibri" panose="020F0502020204030204" pitchFamily="34" charset="0"/>
+                        <a:ea typeface="+mn-ea"/>
+                        <a:cs typeface="+mn-cs"/>
+                      </a:endParaRPr>
+                    </a:p>
                   </a:txBody>
                   <a:tcPr marL="57150" marR="57150" marT="28575" marB="28575"/>
                 </a:tc>
@@ -12715,7 +12753,7 @@
                           <a:latin typeface="+mn-lt"/>
                           <a:ea typeface="+mn-ea"/>
                           <a:cs typeface="+mn-cs"/>
-                          <a:hlinkClick r:id="rId35"/>
+                          <a:hlinkClick r:id="rId36"/>
                         </a:rPr>
                         <a:t>Enable Diagnostics Logging</a:t>
                       </a:r>
@@ -12870,7 +12908,7 @@
                           <a:latin typeface="+mn-lt"/>
                           <a:ea typeface="+mn-ea"/>
                           <a:cs typeface="+mn-cs"/>
-                          <a:hlinkClick r:id="rId36"/>
+                          <a:hlinkClick r:id="rId37"/>
                         </a:rPr>
                         <a:t>Azure automation</a:t>
                       </a:r>

</xml_diff>

<commit_message>
Script and Deployment Guide Changes
Script and Deployment Guide Changes
</commit_message>
<xml_diff>
--- a/documents/Azure_PCI_PaaS_Management_Reference_Architecture.pptx
+++ b/documents/Azure_PCI_PaaS_Management_Reference_Architecture.pptx
@@ -208,7 +208,7 @@
           <a:p>
             <a:fld id="{8BAD32BC-9A36-444A-AC36-0834185C81D6}" type="datetimeFigureOut">
               <a:rPr lang="en-US" smtClean="0"/>
-              <a:t>2/2/2017</a:t>
+              <a:t>2/3/2017</a:t>
             </a:fld>
             <a:endParaRPr lang="en-US"/>
           </a:p>
@@ -2882,14 +2882,14 @@
           </a:ln>
           <a:extLst>
             <a:ext uri="{909E8E84-426E-40dd-AFC4-6F175D3DCCD1}">
-              <a14:hiddenFill xmlns:a14="http://schemas.microsoft.com/office/drawing/2010/main" xmlns="">
+              <a14:hiddenFill xmlns="" xmlns:a14="http://schemas.microsoft.com/office/drawing/2010/main">
                 <a:solidFill>
                   <a:srgbClr val="FFFFFF"/>
                 </a:solidFill>
               </a14:hiddenFill>
             </a:ext>
             <a:ext uri="{91240B29-F687-4f45-9708-019B960494DF}">
-              <a14:hiddenLine xmlns:a14="http://schemas.microsoft.com/office/drawing/2010/main" xmlns="" w="9525">
+              <a14:hiddenLine xmlns="" xmlns:a14="http://schemas.microsoft.com/office/drawing/2010/main" w="9525">
                 <a:solidFill>
                   <a:srgbClr val="000000"/>
                 </a:solidFill>
@@ -12292,7 +12292,7 @@
           <p:nvPr>
             <p:extLst>
               <p:ext uri="{D42A27DB-BD31-4B8C-83A1-F6EECF244321}">
-                <p14:modId xmlns:p14="http://schemas.microsoft.com/office/powerpoint/2010/main" val="3212476861"/>
+                <p14:modId xmlns:p14="http://schemas.microsoft.com/office/powerpoint/2010/main" val="3177429196"/>
               </p:ext>
             </p:extLst>
           </p:nvPr>
@@ -12445,6 +12445,44 @@
                         <a:cs typeface="+mn-cs"/>
                       </a:endParaRPr>
                     </a:p>
+                    <a:p>
+                      <a:pPr marL="173038" indent="-173038" rtl="0">
+                        <a:buFont typeface="Arial" panose="020B0604020202020204" pitchFamily="34" charset="0"/>
+                        <a:buChar char="•"/>
+                      </a:pPr>
+                      <a:r>
+                        <a:rPr lang="en-US" sz="800" kern="1200" dirty="0" err="1">
+                          <a:solidFill>
+                            <a:srgbClr val="7F7F7F"/>
+                          </a:solidFill>
+                          <a:latin typeface="Calibri" panose="020F0502020204030204" pitchFamily="34" charset="0"/>
+                          <a:ea typeface="+mn-ea"/>
+                          <a:cs typeface="+mn-cs"/>
+                          <a:hlinkClick r:id="rId35"/>
+                        </a:rPr>
+                        <a:t>AutoShutDown</a:t>
+                      </a:r>
+                      <a:r>
+                        <a:rPr lang="en-US" sz="800" kern="1200" dirty="0">
+                          <a:solidFill>
+                            <a:srgbClr val="7F7F7F"/>
+                          </a:solidFill>
+                          <a:latin typeface="Calibri" panose="020F0502020204030204" pitchFamily="34" charset="0"/>
+                          <a:ea typeface="+mn-ea"/>
+                          <a:cs typeface="+mn-cs"/>
+                          <a:hlinkClick r:id="rId35"/>
+                        </a:rPr>
+                        <a:t> Policy</a:t>
+                      </a:r>
+                      <a:endParaRPr lang="en-US" sz="800" kern="1200" dirty="0">
+                        <a:solidFill>
+                          <a:srgbClr val="7F7F7F"/>
+                        </a:solidFill>
+                        <a:latin typeface="Calibri" panose="020F0502020204030204" pitchFamily="34" charset="0"/>
+                        <a:ea typeface="+mn-ea"/>
+                        <a:cs typeface="+mn-cs"/>
+                      </a:endParaRPr>
+                    </a:p>
                   </a:txBody>
                   <a:tcPr marL="57150" marR="57150" marT="28575" marB="28575"/>
                 </a:tc>
@@ -12715,7 +12753,7 @@
                           <a:latin typeface="+mn-lt"/>
                           <a:ea typeface="+mn-ea"/>
                           <a:cs typeface="+mn-cs"/>
-                          <a:hlinkClick r:id="rId35"/>
+                          <a:hlinkClick r:id="rId36"/>
                         </a:rPr>
                         <a:t>Enable Diagnostics Logging</a:t>
                       </a:r>
@@ -12870,7 +12908,7 @@
                           <a:latin typeface="+mn-lt"/>
                           <a:ea typeface="+mn-ea"/>
                           <a:cs typeface="+mn-cs"/>
-                          <a:hlinkClick r:id="rId36"/>
+                          <a:hlinkClick r:id="rId37"/>
                         </a:rPr>
                         <a:t>Azure automation</a:t>
                       </a:r>

</xml_diff>

<commit_message>
Merging updates from internal repository
</commit_message>
<xml_diff>
--- a/documents/Azure_PCI_PaaS_Management_Reference_Architecture.pptx
+++ b/documents/Azure_PCI_PaaS_Management_Reference_Architecture.pptx
@@ -211,7 +211,7 @@
           <a:p>
             <a:fld id="{8BAD32BC-9A36-444A-AC36-0834185C81D6}" type="datetimeFigureOut">
               <a:rPr lang="en-US" smtClean="0"/>
-              <a:t>3/24/2017</a:t>
+              <a:t>3/29/2017</a:t>
             </a:fld>
             <a:endParaRPr lang="en-US"/>
           </a:p>
@@ -376,7 +376,7 @@
           <a:p>
             <a:fld id="{9513AB20-DDA0-498D-8E7E-1827A09E602C}" type="datetimeFigureOut">
               <a:rPr lang="en-US" smtClean="0"/>
-              <a:t>3/24/2017</a:t>
+              <a:t>3/29/2017</a:t>
             </a:fld>
             <a:endParaRPr lang="en-US"/>
           </a:p>
@@ -6544,14 +6544,16 @@
         </p:nvSpPr>
         <p:spPr>
           <a:xfrm>
-            <a:off x="5019254" y="3268403"/>
+            <a:off x="5009923" y="3259072"/>
             <a:ext cx="3873921" cy="992135"/>
           </a:xfrm>
           <a:prstGeom prst="rect">
             <a:avLst/>
           </a:prstGeom>
           <a:solidFill>
-            <a:srgbClr val="1D6E9B"/>
+            <a:srgbClr val="D2326B">
+              <a:lumMod val="75000"/>
+            </a:srgbClr>
           </a:solidFill>
           <a:ln w="9525" cap="flat" cmpd="sng" algn="ctr">
             <a:noFill/>
@@ -6560,42 +6562,20 @@
           <a:effectLst/>
         </p:spPr>
         <p:txBody>
-          <a:bodyPr lIns="274320" tIns="0" rtlCol="0" anchor="ctr"/>
+          <a:bodyPr wrap="square" rtlCol="0" anchor="ctr">
+            <a:noAutofit/>
+          </a:bodyPr>
           <a:lstStyle/>
           <a:p>
-            <a:pPr marL="0" marR="0" lvl="0" indent="0" defTabSz="1219170" eaLnBrk="1" fontAlgn="auto" latinLnBrk="0" hangingPunct="1">
-              <a:lnSpc>
-                <a:spcPct val="100000"/>
-              </a:lnSpc>
-              <a:spcBef>
-                <a:spcPts val="0"/>
-              </a:spcBef>
-              <a:spcAft>
-                <a:spcPts val="0"/>
-              </a:spcAft>
-              <a:buClrTx/>
-              <a:buSzTx/>
-              <a:buFontTx/>
-              <a:buNone/>
-              <a:tabLst/>
-              <a:defRPr/>
-            </a:pPr>
-            <a:r>
-              <a:rPr kumimoji="0" lang="en-US" sz="3200" b="0" i="0" u="none" strike="noStrike" kern="0" cap="none" spc="0" normalizeH="0" baseline="0" noProof="0" dirty="0">
-                <a:ln>
-                  <a:noFill/>
-                </a:ln>
+            <a:pPr defTabSz="1219170"/>
+            <a:r>
+              <a:rPr lang="en-US" sz="3200" kern="0" dirty="0">
                 <a:solidFill>
-                  <a:srgbClr val="FFFFFF"/>
+                  <a:prstClr val="white"/>
                 </a:solidFill>
-                <a:effectLst/>
-                <a:uLnTx/>
-                <a:uFillTx/>
                 <a:latin typeface="Open Sans Light"/>
-                <a:ea typeface="+mn-ea"/>
-                <a:cs typeface="+mn-cs"/>
               </a:rPr>
-              <a:t>03</a:t>
+              <a:t>  03</a:t>
             </a:r>
           </a:p>
         </p:txBody>
@@ -6615,7 +6595,9 @@
             <a:avLst/>
           </a:prstGeom>
           <a:solidFill>
-            <a:srgbClr val="CF423F"/>
+            <a:srgbClr val="21B169">
+              <a:lumMod val="75000"/>
+            </a:srgbClr>
           </a:solidFill>
           <a:ln w="9525" cap="flat" cmpd="sng" algn="ctr">
             <a:noFill/>
@@ -6624,42 +6606,20 @@
           <a:effectLst/>
         </p:spPr>
         <p:txBody>
-          <a:bodyPr lIns="274320" tIns="0" rtlCol="0" anchor="ctr"/>
+          <a:bodyPr wrap="square" rtlCol="0" anchor="ctr">
+            <a:noAutofit/>
+          </a:bodyPr>
           <a:lstStyle/>
           <a:p>
-            <a:pPr marL="0" marR="0" lvl="0" indent="0" defTabSz="1219170" eaLnBrk="1" fontAlgn="auto" latinLnBrk="0" hangingPunct="1">
-              <a:lnSpc>
-                <a:spcPct val="100000"/>
-              </a:lnSpc>
-              <a:spcBef>
-                <a:spcPts val="0"/>
-              </a:spcBef>
-              <a:spcAft>
-                <a:spcPts val="0"/>
-              </a:spcAft>
-              <a:buClrTx/>
-              <a:buSzTx/>
-              <a:buFontTx/>
-              <a:buNone/>
-              <a:tabLst/>
-              <a:defRPr/>
-            </a:pPr>
-            <a:r>
-              <a:rPr kumimoji="0" lang="en-US" sz="3200" b="0" i="0" u="none" strike="noStrike" kern="0" cap="none" spc="0" normalizeH="0" baseline="0" noProof="0" dirty="0">
-                <a:ln>
-                  <a:noFill/>
-                </a:ln>
+            <a:pPr defTabSz="1219170"/>
+            <a:r>
+              <a:rPr lang="en-US" sz="2800" kern="0" dirty="0">
                 <a:solidFill>
-                  <a:srgbClr val="FFFFFF"/>
+                  <a:prstClr val="white"/>
                 </a:solidFill>
-                <a:effectLst/>
-                <a:uLnTx/>
-                <a:uFillTx/>
                 <a:latin typeface="Open Sans Light"/>
-                <a:ea typeface="+mn-ea"/>
-                <a:cs typeface="+mn-cs"/>
               </a:rPr>
-              <a:t>04</a:t>
+              <a:t>  04</a:t>
             </a:r>
           </a:p>
         </p:txBody>
@@ -6730,7 +6690,7 @@
         </p:nvSpPr>
         <p:spPr>
           <a:xfrm>
-            <a:off x="5962650" y="2546351"/>
+            <a:off x="5962650" y="2471672"/>
             <a:ext cx="2590800" cy="667875"/>
           </a:xfrm>
           <a:prstGeom prst="rect">
@@ -6788,7 +6748,7 @@
         </p:nvSpPr>
         <p:spPr>
           <a:xfrm>
-            <a:off x="5962650" y="3529943"/>
+            <a:off x="5962650" y="4396615"/>
             <a:ext cx="2590800" cy="654795"/>
           </a:xfrm>
           <a:prstGeom prst="rect">
@@ -6844,8 +6804,8 @@
         </p:nvSpPr>
         <p:spPr>
           <a:xfrm>
-            <a:off x="5962650" y="4446065"/>
-            <a:ext cx="2590800" cy="798680"/>
+            <a:off x="5962650" y="3264097"/>
+            <a:ext cx="2590800" cy="1007968"/>
           </a:xfrm>
           <a:prstGeom prst="rect">
             <a:avLst/>
@@ -6869,7 +6829,7 @@
                 </a:solidFill>
                 <a:latin typeface="Open Sans Light"/>
               </a:rPr>
-              <a:t>Learn and Democratize Solution</a:t>
+              <a:t>Learn and Democratize a secure and compliant Azure PaaS deployment</a:t>
             </a:r>
           </a:p>
           <a:p>
@@ -6878,17 +6838,6 @@
                 <a:spcPct val="85000"/>
               </a:lnSpc>
             </a:pPr>
-            <a:r>
-              <a:rPr lang="en-US" sz="1100" dirty="0" err="1">
-                <a:solidFill>
-                  <a:schemeClr val="bg1">
-                    <a:lumMod val="95000"/>
-                  </a:schemeClr>
-                </a:solidFill>
-                <a:latin typeface="Open Sans Light"/>
-              </a:rPr>
-              <a:t>Opensourcing</a:t>
-            </a:r>
             <a:r>
               <a:rPr lang="en-US" sz="1100" dirty="0">
                 <a:solidFill>
@@ -6898,7 +6847,7 @@
                 </a:solidFill>
                 <a:latin typeface="Open Sans Light"/>
               </a:rPr>
-              <a:t> allows us to learn from the larger community</a:t>
+              <a:t>Open sourcing allows us to learn from the larger community</a:t>
             </a:r>
           </a:p>
         </p:txBody>
@@ -16140,14 +16089,14 @@
           <p:nvPr>
             <p:extLst>
               <p:ext uri="{D42A27DB-BD31-4B8C-83A1-F6EECF244321}">
-                <p14:modId xmlns:p14="http://schemas.microsoft.com/office/powerpoint/2010/main" val="2269411634"/>
+                <p14:modId xmlns:p14="http://schemas.microsoft.com/office/powerpoint/2010/main" val="1774845198"/>
               </p:ext>
             </p:extLst>
           </p:nvPr>
         </p:nvGraphicFramePr>
         <p:xfrm>
           <a:off x="442324" y="2335780"/>
-          <a:ext cx="1880870" cy="1074420"/>
+          <a:ext cx="1880870" cy="1144905"/>
         </p:xfrm>
         <a:graphic>
           <a:graphicData uri="http://schemas.openxmlformats.org/drawingml/2006/table">
@@ -16164,7 +16113,7 @@
                   </a:extLst>
                 </a:gridCol>
               </a:tblGrid>
-              <a:tr h="163058">
+              <a:tr h="207057">
                 <a:tc>
                   <a:txBody>
                     <a:bodyPr/>
@@ -16184,7 +16133,7 @@
                   </a:ext>
                 </a:extLst>
               </a:tr>
-              <a:tr h="879170">
+              <a:tr h="937848">
                 <a:tc>
                   <a:txBody>
                     <a:bodyPr/>
@@ -16313,17 +16262,14 @@
                         </a:rPr>
                         <a:t>Allow SQL DB traffic</a:t>
                       </a:r>
-                      <a:r>
-                        <a:rPr lang="en-US" sz="900" b="0" i="0" u="none" strike="noStrike" kern="1200" baseline="0" dirty="0">
-                          <a:solidFill>
-                            <a:schemeClr val="bg1"/>
-                          </a:solidFill>
-                          <a:latin typeface="+mn-lt"/>
-                          <a:ea typeface="+mn-ea"/>
-                          <a:cs typeface="+mn-cs"/>
-                        </a:rPr>
-                        <a:t>(not understanding)</a:t>
-                      </a:r>
+                      <a:endParaRPr lang="en-US" sz="900" b="0" i="0" u="none" strike="noStrike" kern="1200" baseline="0" dirty="0">
+                        <a:solidFill>
+                          <a:schemeClr val="bg1"/>
+                        </a:solidFill>
+                        <a:latin typeface="+mn-lt"/>
+                        <a:ea typeface="+mn-ea"/>
+                        <a:cs typeface="+mn-cs"/>
+                      </a:endParaRPr>
                     </a:p>
                   </a:txBody>
                   <a:tcPr marL="57150" marR="57150" marT="28575" marB="28575"/>
@@ -16461,7 +16407,7 @@
           <p:nvPr>
             <p:extLst>
               <p:ext uri="{D42A27DB-BD31-4B8C-83A1-F6EECF244321}">
-                <p14:modId xmlns:p14="http://schemas.microsoft.com/office/powerpoint/2010/main" val="3274176744"/>
+                <p14:modId xmlns:p14="http://schemas.microsoft.com/office/powerpoint/2010/main" val="2124490779"/>
               </p:ext>
             </p:extLst>
           </p:nvPr>

</xml_diff>

<commit_message>
Updating docs. See description for details
1) Updating README.md with corresponding image files.
Adding TOC, formatting, and updating a bit of text
2) PreDeployment: making sqlADAdminPassword as a parameter
3) PostDeployment: removing some empty lines
</commit_message>
<xml_diff>
--- a/documents/Azure_PCI_PaaS_Management_Reference_Architecture.pptx
+++ b/documents/Azure_PCI_PaaS_Management_Reference_Architecture.pptx
@@ -5,10 +5,10 @@
     <p:sldMasterId id="2147483660" r:id="rId1"/>
   </p:sldMasterIdLst>
   <p:notesMasterIdLst>
-    <p:notesMasterId r:id="rId11"/>
+    <p:notesMasterId r:id="rId12"/>
   </p:notesMasterIdLst>
   <p:handoutMasterIdLst>
-    <p:handoutMasterId r:id="rId12"/>
+    <p:handoutMasterId r:id="rId13"/>
   </p:handoutMasterIdLst>
   <p:sldIdLst>
     <p:sldId id="256" r:id="rId2"/>
@@ -20,6 +20,7 @@
     <p:sldId id="257" r:id="rId8"/>
     <p:sldId id="259" r:id="rId9"/>
     <p:sldId id="262" r:id="rId10"/>
+    <p:sldId id="266" r:id="rId11"/>
   </p:sldIdLst>
   <p:sldSz cx="10160000" cy="5715000"/>
   <p:notesSz cx="6858000" cy="9144000"/>
@@ -211,7 +212,7 @@
           <a:p>
             <a:fld id="{8BAD32BC-9A36-444A-AC36-0834185C81D6}" type="datetimeFigureOut">
               <a:rPr lang="en-US" smtClean="0"/>
-              <a:t>3/29/2017</a:t>
+              <a:t>4/4/2017</a:t>
             </a:fld>
             <a:endParaRPr lang="en-US"/>
           </a:p>
@@ -376,7 +377,7 @@
           <a:p>
             <a:fld id="{9513AB20-DDA0-498D-8E7E-1827A09E602C}" type="datetimeFigureOut">
               <a:rPr lang="en-US" smtClean="0"/>
-              <a:t>3/29/2017</a:t>
+              <a:t>4/4/2017</a:t>
             </a:fld>
             <a:endParaRPr lang="en-US"/>
           </a:p>
@@ -2885,14 +2886,14 @@
           </a:ln>
           <a:extLst>
             <a:ext uri="{909E8E84-426E-40dd-AFC4-6F175D3DCCD1}">
-              <a14:hiddenFill xmlns:a14="http://schemas.microsoft.com/office/drawing/2010/main" xmlns="">
+              <a14:hiddenFill xmlns="" xmlns:a14="http://schemas.microsoft.com/office/drawing/2010/main">
                 <a:solidFill>
                   <a:srgbClr val="FFFFFF"/>
                 </a:solidFill>
               </a14:hiddenFill>
             </a:ext>
             <a:ext uri="{91240B29-F687-4f45-9708-019B960494DF}">
-              <a14:hiddenLine xmlns:a14="http://schemas.microsoft.com/office/drawing/2010/main" xmlns="" w="9525">
+              <a14:hiddenLine xmlns="" xmlns:a14="http://schemas.microsoft.com/office/drawing/2010/main" w="9525">
                 <a:solidFill>
                   <a:srgbClr val="000000"/>
                 </a:solidFill>
@@ -4831,6 +4832,3806 @@
     <p:extLst>
       <p:ext uri="{BB962C8B-B14F-4D97-AF65-F5344CB8AC3E}">
         <p14:creationId xmlns:p14="http://schemas.microsoft.com/office/powerpoint/2010/main" val="3444700808"/>
+      </p:ext>
+    </p:extLst>
+  </p:cSld>
+  <p:clrMapOvr>
+    <a:masterClrMapping/>
+  </p:clrMapOvr>
+</p:sld>
+</file>
+
+<file path=ppt/slides/slide10.xml><?xml version="1.0" encoding="utf-8"?>
+<p:sld xmlns:a="http://schemas.openxmlformats.org/drawingml/2006/main" xmlns:r="http://schemas.openxmlformats.org/officeDocument/2006/relationships" xmlns:p="http://schemas.openxmlformats.org/presentationml/2006/main">
+  <p:cSld>
+    <p:spTree>
+      <p:nvGrpSpPr>
+        <p:cNvPr id="1" name=""/>
+        <p:cNvGrpSpPr/>
+        <p:nvPr/>
+      </p:nvGrpSpPr>
+      <p:grpSpPr>
+        <a:xfrm>
+          <a:off x="0" y="0"/>
+          <a:ext cx="0" cy="0"/>
+          <a:chOff x="0" y="0"/>
+          <a:chExt cx="0" cy="0"/>
+        </a:xfrm>
+      </p:grpSpPr>
+      <p:sp>
+        <p:nvSpPr>
+          <p:cNvPr id="3" name="Rectangle: Rounded Corners 2"/>
+          <p:cNvSpPr/>
+          <p:nvPr/>
+        </p:nvSpPr>
+        <p:spPr>
+          <a:xfrm>
+            <a:off x="1833175" y="1008179"/>
+            <a:ext cx="6902564" cy="4185728"/>
+          </a:xfrm>
+          <a:prstGeom prst="roundRect">
+            <a:avLst>
+              <a:gd name="adj" fmla="val 4803"/>
+            </a:avLst>
+          </a:prstGeom>
+          <a:solidFill>
+            <a:schemeClr val="bg1">
+              <a:lumMod val="95000"/>
+              <a:alpha val="25000"/>
+            </a:schemeClr>
+          </a:solidFill>
+        </p:spPr>
+        <p:style>
+          <a:lnRef idx="2">
+            <a:schemeClr val="accent3"/>
+          </a:lnRef>
+          <a:fillRef idx="1">
+            <a:schemeClr val="lt1"/>
+          </a:fillRef>
+          <a:effectRef idx="0">
+            <a:schemeClr val="accent3"/>
+          </a:effectRef>
+          <a:fontRef idx="minor">
+            <a:schemeClr val="dk1"/>
+          </a:fontRef>
+        </p:style>
+        <p:txBody>
+          <a:bodyPr rtlCol="0" anchor="ctr"/>
+          <a:lstStyle/>
+          <a:p>
+            <a:pPr algn="ctr"/>
+            <a:endParaRPr lang="en-US" sz="2400" dirty="0"/>
+          </a:p>
+        </p:txBody>
+      </p:sp>
+      <p:sp>
+        <p:nvSpPr>
+          <p:cNvPr id="4" name="Rectangle: Rounded Corners 3"/>
+          <p:cNvSpPr/>
+          <p:nvPr/>
+        </p:nvSpPr>
+        <p:spPr>
+          <a:xfrm>
+            <a:off x="2025360" y="1391948"/>
+            <a:ext cx="6499364" cy="3192691"/>
+          </a:xfrm>
+          <a:prstGeom prst="roundRect">
+            <a:avLst>
+              <a:gd name="adj" fmla="val 4803"/>
+            </a:avLst>
+          </a:prstGeom>
+          <a:noFill/>
+          <a:ln>
+            <a:prstDash val="sysDash"/>
+          </a:ln>
+        </p:spPr>
+        <p:style>
+          <a:lnRef idx="2">
+            <a:schemeClr val="accent3"/>
+          </a:lnRef>
+          <a:fillRef idx="1002">
+            <a:schemeClr val="lt2"/>
+          </a:fillRef>
+          <a:effectRef idx="0">
+            <a:schemeClr val="accent3"/>
+          </a:effectRef>
+          <a:fontRef idx="minor">
+            <a:schemeClr val="dk1"/>
+          </a:fontRef>
+        </p:style>
+        <p:txBody>
+          <a:bodyPr rtlCol="0" anchor="ctr"/>
+          <a:lstStyle/>
+          <a:p>
+            <a:pPr algn="ctr"/>
+            <a:endParaRPr lang="en-US" sz="2400" dirty="0"/>
+          </a:p>
+        </p:txBody>
+      </p:sp>
+      <p:sp>
+        <p:nvSpPr>
+          <p:cNvPr id="5" name="Rectangle: Rounded Corners 4"/>
+          <p:cNvSpPr/>
+          <p:nvPr/>
+        </p:nvSpPr>
+        <p:spPr>
+          <a:xfrm>
+            <a:off x="2133441" y="1586295"/>
+            <a:ext cx="3932495" cy="2776522"/>
+          </a:xfrm>
+          <a:prstGeom prst="roundRect">
+            <a:avLst>
+              <a:gd name="adj" fmla="val 4803"/>
+            </a:avLst>
+          </a:prstGeom>
+          <a:ln w="12700">
+            <a:prstDash val="sysDash"/>
+          </a:ln>
+        </p:spPr>
+        <p:style>
+          <a:lnRef idx="2">
+            <a:schemeClr val="accent3"/>
+          </a:lnRef>
+          <a:fillRef idx="1">
+            <a:schemeClr val="lt1"/>
+          </a:fillRef>
+          <a:effectRef idx="0">
+            <a:schemeClr val="accent3"/>
+          </a:effectRef>
+          <a:fontRef idx="minor">
+            <a:schemeClr val="dk1"/>
+          </a:fontRef>
+        </p:style>
+        <p:txBody>
+          <a:bodyPr rtlCol="0" anchor="t"/>
+          <a:lstStyle/>
+          <a:p>
+            <a:endParaRPr lang="en-US" sz="2400" dirty="0"/>
+          </a:p>
+        </p:txBody>
+      </p:sp>
+      <p:pic>
+        <p:nvPicPr>
+          <p:cNvPr id="6" name="Picture 5"/>
+          <p:cNvPicPr>
+            <a:picLocks noChangeAspect="1"/>
+          </p:cNvPicPr>
+          <p:nvPr/>
+        </p:nvPicPr>
+        <p:blipFill>
+          <a:blip r:embed="rId2">
+            <a:extLst>
+              <a:ext uri="{28A0092B-C50C-407E-A947-70E740481C1C}">
+                <a14:useLocalDpi xmlns:a14="http://schemas.microsoft.com/office/drawing/2010/main" val="0"/>
+              </a:ext>
+            </a:extLst>
+          </a:blip>
+          <a:stretch>
+            <a:fillRect/>
+          </a:stretch>
+        </p:blipFill>
+        <p:spPr>
+          <a:xfrm>
+            <a:off x="2025361" y="1324423"/>
+            <a:ext cx="166608" cy="166608"/>
+          </a:xfrm>
+          <a:prstGeom prst="rect">
+            <a:avLst/>
+          </a:prstGeom>
+        </p:spPr>
+      </p:pic>
+      <p:pic>
+        <p:nvPicPr>
+          <p:cNvPr id="7" name="Picture 6"/>
+          <p:cNvPicPr>
+            <a:picLocks noChangeAspect="1"/>
+          </p:cNvPicPr>
+          <p:nvPr/>
+        </p:nvPicPr>
+        <p:blipFill>
+          <a:blip r:embed="rId3">
+            <a:extLst>
+              <a:ext uri="{28A0092B-C50C-407E-A947-70E740481C1C}">
+                <a14:useLocalDpi xmlns:a14="http://schemas.microsoft.com/office/drawing/2010/main" val="0"/>
+              </a:ext>
+            </a:extLst>
+          </a:blip>
+          <a:stretch>
+            <a:fillRect/>
+          </a:stretch>
+        </p:blipFill>
+        <p:spPr>
+          <a:xfrm>
+            <a:off x="6423430" y="4676465"/>
+            <a:ext cx="328960" cy="328960"/>
+          </a:xfrm>
+          <a:prstGeom prst="rect">
+            <a:avLst/>
+          </a:prstGeom>
+        </p:spPr>
+      </p:pic>
+      <p:pic>
+        <p:nvPicPr>
+          <p:cNvPr id="8" name="Picture 7"/>
+          <p:cNvPicPr>
+            <a:picLocks noChangeAspect="1"/>
+          </p:cNvPicPr>
+          <p:nvPr/>
+        </p:nvPicPr>
+        <p:blipFill>
+          <a:blip r:embed="rId4"/>
+          <a:stretch>
+            <a:fillRect/>
+          </a:stretch>
+        </p:blipFill>
+        <p:spPr>
+          <a:xfrm>
+            <a:off x="8208277" y="621600"/>
+            <a:ext cx="494905" cy="522204"/>
+          </a:xfrm>
+          <a:prstGeom prst="rect">
+            <a:avLst/>
+          </a:prstGeom>
+        </p:spPr>
+      </p:pic>
+      <p:grpSp>
+        <p:nvGrpSpPr>
+          <p:cNvPr id="9" name="Group 8"/>
+          <p:cNvGrpSpPr/>
+          <p:nvPr/>
+        </p:nvGrpSpPr>
+        <p:grpSpPr>
+          <a:xfrm>
+            <a:off x="2407687" y="1619249"/>
+            <a:ext cx="1777135" cy="887851"/>
+            <a:chOff x="3314119" y="599562"/>
+            <a:chExt cx="2001400" cy="1420560"/>
+          </a:xfrm>
+        </p:grpSpPr>
+        <p:sp>
+          <p:nvSpPr>
+            <p:cNvPr id="10" name="Rectangle: Rounded Corners 9"/>
+            <p:cNvSpPr/>
+            <p:nvPr/>
+          </p:nvSpPr>
+          <p:spPr>
+            <a:xfrm>
+              <a:off x="3314119" y="748723"/>
+              <a:ext cx="2001400" cy="1271399"/>
+            </a:xfrm>
+            <a:prstGeom prst="roundRect">
+              <a:avLst>
+                <a:gd name="adj" fmla="val 4803"/>
+              </a:avLst>
+            </a:prstGeom>
+            <a:solidFill>
+              <a:schemeClr val="accent2">
+                <a:lumMod val="20000"/>
+                <a:lumOff val="80000"/>
+              </a:schemeClr>
+            </a:solidFill>
+            <a:ln w="12700">
+              <a:prstDash val="sysDot"/>
+            </a:ln>
+          </p:spPr>
+          <p:style>
+            <a:lnRef idx="2">
+              <a:schemeClr val="accent3"/>
+            </a:lnRef>
+            <a:fillRef idx="1">
+              <a:schemeClr val="lt1"/>
+            </a:fillRef>
+            <a:effectRef idx="0">
+              <a:schemeClr val="accent3"/>
+            </a:effectRef>
+            <a:fontRef idx="minor">
+              <a:schemeClr val="dk1"/>
+            </a:fontRef>
+          </p:style>
+          <p:txBody>
+            <a:bodyPr rtlCol="0" anchor="ctr"/>
+            <a:lstStyle/>
+            <a:p>
+              <a:pPr algn="ctr"/>
+              <a:endParaRPr lang="en-US" sz="2400"/>
+            </a:p>
+          </p:txBody>
+        </p:sp>
+        <p:pic>
+          <p:nvPicPr>
+            <p:cNvPr id="11" name="Picture 10"/>
+            <p:cNvPicPr>
+              <a:picLocks noChangeAspect="1"/>
+            </p:cNvPicPr>
+            <p:nvPr/>
+          </p:nvPicPr>
+          <p:blipFill>
+            <a:blip r:embed="rId5"/>
+            <a:stretch>
+              <a:fillRect/>
+            </a:stretch>
+          </p:blipFill>
+          <p:spPr>
+            <a:xfrm>
+              <a:off x="4933382" y="599562"/>
+              <a:ext cx="325163" cy="380800"/>
+            </a:xfrm>
+            <a:prstGeom prst="rect">
+              <a:avLst/>
+            </a:prstGeom>
+          </p:spPr>
+        </p:pic>
+      </p:grpSp>
+      <p:sp>
+        <p:nvSpPr>
+          <p:cNvPr id="12" name="Rectangle: Rounded Corners 11"/>
+          <p:cNvSpPr/>
+          <p:nvPr/>
+        </p:nvSpPr>
+        <p:spPr>
+          <a:xfrm>
+            <a:off x="2387698" y="2712630"/>
+            <a:ext cx="1806270" cy="1552442"/>
+          </a:xfrm>
+          <a:prstGeom prst="roundRect">
+            <a:avLst>
+              <a:gd name="adj" fmla="val 4803"/>
+            </a:avLst>
+          </a:prstGeom>
+          <a:ln w="12700">
+            <a:prstDash val="sysDot"/>
+          </a:ln>
+        </p:spPr>
+        <p:style>
+          <a:lnRef idx="2">
+            <a:schemeClr val="accent3"/>
+          </a:lnRef>
+          <a:fillRef idx="1">
+            <a:schemeClr val="lt1"/>
+          </a:fillRef>
+          <a:effectRef idx="0">
+            <a:schemeClr val="accent3"/>
+          </a:effectRef>
+          <a:fontRef idx="minor">
+            <a:schemeClr val="dk1"/>
+          </a:fontRef>
+        </p:style>
+        <p:txBody>
+          <a:bodyPr rtlCol="0" anchor="ctr"/>
+          <a:lstStyle/>
+          <a:p>
+            <a:pPr algn="ctr"/>
+            <a:endParaRPr lang="en-US" sz="2400"/>
+          </a:p>
+        </p:txBody>
+      </p:sp>
+      <p:pic>
+        <p:nvPicPr>
+          <p:cNvPr id="13" name="Picture 12"/>
+          <p:cNvPicPr>
+            <a:picLocks noChangeAspect="1"/>
+          </p:cNvPicPr>
+          <p:nvPr/>
+        </p:nvPicPr>
+        <p:blipFill>
+          <a:blip r:embed="rId5"/>
+          <a:stretch>
+            <a:fillRect/>
+          </a:stretch>
+        </p:blipFill>
+        <p:spPr>
+          <a:xfrm>
+            <a:off x="3579153" y="2929703"/>
+            <a:ext cx="203227" cy="238000"/>
+          </a:xfrm>
+          <a:prstGeom prst="rect">
+            <a:avLst/>
+          </a:prstGeom>
+        </p:spPr>
+      </p:pic>
+      <p:pic>
+        <p:nvPicPr>
+          <p:cNvPr id="14" name="Picture 13"/>
+          <p:cNvPicPr>
+            <a:picLocks noChangeAspect="1"/>
+          </p:cNvPicPr>
+          <p:nvPr/>
+        </p:nvPicPr>
+        <p:blipFill>
+          <a:blip r:embed="rId6">
+            <a:extLst>
+              <a:ext uri="{28A0092B-C50C-407E-A947-70E740481C1C}">
+                <a14:useLocalDpi xmlns:a14="http://schemas.microsoft.com/office/drawing/2010/main" val="0"/>
+              </a:ext>
+            </a:extLst>
+          </a:blip>
+          <a:stretch>
+            <a:fillRect/>
+          </a:stretch>
+        </p:blipFill>
+        <p:spPr>
+          <a:xfrm>
+            <a:off x="2921447" y="2121669"/>
+            <a:ext cx="413601" cy="413601"/>
+          </a:xfrm>
+          <a:prstGeom prst="rect">
+            <a:avLst/>
+          </a:prstGeom>
+        </p:spPr>
+      </p:pic>
+      <p:pic>
+        <p:nvPicPr>
+          <p:cNvPr id="15" name="Picture 14"/>
+          <p:cNvPicPr>
+            <a:picLocks noChangeAspect="1"/>
+          </p:cNvPicPr>
+          <p:nvPr/>
+        </p:nvPicPr>
+        <p:blipFill>
+          <a:blip r:embed="rId7"/>
+          <a:stretch>
+            <a:fillRect/>
+          </a:stretch>
+        </p:blipFill>
+        <p:spPr>
+          <a:xfrm>
+            <a:off x="2760536" y="1901371"/>
+            <a:ext cx="704448" cy="260727"/>
+          </a:xfrm>
+          <a:prstGeom prst="rect">
+            <a:avLst/>
+          </a:prstGeom>
+        </p:spPr>
+      </p:pic>
+      <p:sp>
+        <p:nvSpPr>
+          <p:cNvPr id="16" name="Rectangle: Rounded Corners 15"/>
+          <p:cNvSpPr/>
+          <p:nvPr/>
+        </p:nvSpPr>
+        <p:spPr>
+          <a:xfrm>
+            <a:off x="2456441" y="2781386"/>
+            <a:ext cx="1381458" cy="1154950"/>
+          </a:xfrm>
+          <a:prstGeom prst="roundRect">
+            <a:avLst>
+              <a:gd name="adj" fmla="val 4803"/>
+            </a:avLst>
+          </a:prstGeom>
+          <a:solidFill>
+            <a:schemeClr val="bg1">
+              <a:lumMod val="95000"/>
+            </a:schemeClr>
+          </a:solidFill>
+          <a:ln w="12700">
+            <a:solidFill>
+              <a:srgbClr val="7030A0"/>
+            </a:solidFill>
+            <a:prstDash val="sysDot"/>
+          </a:ln>
+        </p:spPr>
+        <p:style>
+          <a:lnRef idx="2">
+            <a:schemeClr val="accent3"/>
+          </a:lnRef>
+          <a:fillRef idx="1">
+            <a:schemeClr val="lt1"/>
+          </a:fillRef>
+          <a:effectRef idx="0">
+            <a:schemeClr val="accent3"/>
+          </a:effectRef>
+          <a:fontRef idx="minor">
+            <a:schemeClr val="dk1"/>
+          </a:fontRef>
+        </p:style>
+        <p:txBody>
+          <a:bodyPr rtlCol="0" anchor="ctr"/>
+          <a:lstStyle/>
+          <a:p>
+            <a:pPr algn="ctr"/>
+            <a:endParaRPr lang="en-US" sz="2400"/>
+          </a:p>
+        </p:txBody>
+      </p:sp>
+      <p:pic>
+        <p:nvPicPr>
+          <p:cNvPr id="17" name="Picture 16"/>
+          <p:cNvPicPr>
+            <a:picLocks noChangeAspect="1"/>
+          </p:cNvPicPr>
+          <p:nvPr/>
+        </p:nvPicPr>
+        <p:blipFill>
+          <a:blip r:embed="rId8">
+            <a:extLst>
+              <a:ext uri="{28A0092B-C50C-407E-A947-70E740481C1C}">
+                <a14:useLocalDpi xmlns:a14="http://schemas.microsoft.com/office/drawing/2010/main" val="0"/>
+              </a:ext>
+            </a:extLst>
+          </a:blip>
+          <a:stretch>
+            <a:fillRect/>
+          </a:stretch>
+        </p:blipFill>
+        <p:spPr>
+          <a:xfrm>
+            <a:off x="2598981" y="3607188"/>
+            <a:ext cx="254785" cy="254785"/>
+          </a:xfrm>
+          <a:prstGeom prst="rect">
+            <a:avLst/>
+          </a:prstGeom>
+        </p:spPr>
+      </p:pic>
+      <p:pic>
+        <p:nvPicPr>
+          <p:cNvPr id="18" name="Picture 17"/>
+          <p:cNvPicPr>
+            <a:picLocks noChangeAspect="1"/>
+          </p:cNvPicPr>
+          <p:nvPr/>
+        </p:nvPicPr>
+        <p:blipFill>
+          <a:blip r:embed="rId9">
+            <a:extLst>
+              <a:ext uri="{28A0092B-C50C-407E-A947-70E740481C1C}">
+                <a14:useLocalDpi xmlns:a14="http://schemas.microsoft.com/office/drawing/2010/main" val="0"/>
+              </a:ext>
+            </a:extLst>
+          </a:blip>
+          <a:stretch>
+            <a:fillRect/>
+          </a:stretch>
+        </p:blipFill>
+        <p:spPr>
+          <a:xfrm>
+            <a:off x="3525070" y="2795245"/>
+            <a:ext cx="286895" cy="286895"/>
+          </a:xfrm>
+          <a:prstGeom prst="rect">
+            <a:avLst/>
+          </a:prstGeom>
+        </p:spPr>
+      </p:pic>
+      <p:sp>
+        <p:nvSpPr>
+          <p:cNvPr id="19" name="TextBox 18"/>
+          <p:cNvSpPr txBox="1"/>
+          <p:nvPr/>
+        </p:nvSpPr>
+        <p:spPr>
+          <a:xfrm>
+            <a:off x="2513212" y="2744963"/>
+            <a:ext cx="1021975" cy="307777"/>
+          </a:xfrm>
+          <a:prstGeom prst="rect">
+            <a:avLst/>
+          </a:prstGeom>
+          <a:noFill/>
+        </p:spPr>
+        <p:txBody>
+          <a:bodyPr wrap="square" rtlCol="0">
+            <a:spAutoFit/>
+          </a:bodyPr>
+          <a:lstStyle/>
+          <a:p>
+            <a:r>
+              <a:rPr lang="en-US" sz="700" dirty="0"/>
+              <a:t>App Service Environment</a:t>
+            </a:r>
+          </a:p>
+        </p:txBody>
+      </p:sp>
+      <p:sp>
+        <p:nvSpPr>
+          <p:cNvPr id="20" name="TextBox 19"/>
+          <p:cNvSpPr txBox="1"/>
+          <p:nvPr/>
+        </p:nvSpPr>
+        <p:spPr>
+          <a:xfrm>
+            <a:off x="2536757" y="3821209"/>
+            <a:ext cx="486940" cy="184666"/>
+          </a:xfrm>
+          <a:prstGeom prst="rect">
+            <a:avLst/>
+          </a:prstGeom>
+          <a:noFill/>
+        </p:spPr>
+        <p:txBody>
+          <a:bodyPr wrap="square" rtlCol="0">
+            <a:spAutoFit/>
+          </a:bodyPr>
+          <a:lstStyle/>
+          <a:p>
+            <a:r>
+              <a:rPr lang="en-US" sz="600" dirty="0"/>
+              <a:t>Web App</a:t>
+            </a:r>
+          </a:p>
+        </p:txBody>
+      </p:sp>
+      <p:pic>
+        <p:nvPicPr>
+          <p:cNvPr id="21" name="Picture 20"/>
+          <p:cNvPicPr>
+            <a:picLocks noChangeAspect="1"/>
+          </p:cNvPicPr>
+          <p:nvPr/>
+        </p:nvPicPr>
+        <p:blipFill>
+          <a:blip r:embed="rId10">
+            <a:extLst>
+              <a:ext uri="{28A0092B-C50C-407E-A947-70E740481C1C}">
+                <a14:useLocalDpi xmlns:a14="http://schemas.microsoft.com/office/drawing/2010/main" val="0"/>
+              </a:ext>
+            </a:extLst>
+          </a:blip>
+          <a:stretch>
+            <a:fillRect/>
+          </a:stretch>
+        </p:blipFill>
+        <p:spPr>
+          <a:xfrm>
+            <a:off x="5163236" y="3612030"/>
+            <a:ext cx="359907" cy="359907"/>
+          </a:xfrm>
+          <a:prstGeom prst="rect">
+            <a:avLst/>
+          </a:prstGeom>
+        </p:spPr>
+      </p:pic>
+      <p:pic>
+        <p:nvPicPr>
+          <p:cNvPr id="22" name="Picture 21"/>
+          <p:cNvPicPr>
+            <a:picLocks noChangeAspect="1"/>
+          </p:cNvPicPr>
+          <p:nvPr/>
+        </p:nvPicPr>
+        <p:blipFill>
+          <a:blip r:embed="rId11">
+            <a:extLst>
+              <a:ext uri="{28A0092B-C50C-407E-A947-70E740481C1C}">
+                <a14:useLocalDpi xmlns:a14="http://schemas.microsoft.com/office/drawing/2010/main" val="0"/>
+              </a:ext>
+            </a:extLst>
+          </a:blip>
+          <a:stretch>
+            <a:fillRect/>
+          </a:stretch>
+        </p:blipFill>
+        <p:spPr>
+          <a:xfrm>
+            <a:off x="4770957" y="3264286"/>
+            <a:ext cx="409210" cy="409210"/>
+          </a:xfrm>
+          <a:prstGeom prst="rect">
+            <a:avLst/>
+          </a:prstGeom>
+        </p:spPr>
+      </p:pic>
+      <p:sp>
+        <p:nvSpPr>
+          <p:cNvPr id="23" name="TextBox 22"/>
+          <p:cNvSpPr txBox="1"/>
+          <p:nvPr/>
+        </p:nvSpPr>
+        <p:spPr>
+          <a:xfrm>
+            <a:off x="5142273" y="3436161"/>
+            <a:ext cx="489966" cy="184666"/>
+          </a:xfrm>
+          <a:prstGeom prst="rect">
+            <a:avLst/>
+          </a:prstGeom>
+          <a:noFill/>
+        </p:spPr>
+        <p:txBody>
+          <a:bodyPr wrap="square" rtlCol="0">
+            <a:spAutoFit/>
+          </a:bodyPr>
+          <a:lstStyle/>
+          <a:p>
+            <a:r>
+              <a:rPr lang="en-US" sz="600" dirty="0"/>
+              <a:t>Runbooks</a:t>
+            </a:r>
+          </a:p>
+        </p:txBody>
+      </p:sp>
+      <p:sp>
+        <p:nvSpPr>
+          <p:cNvPr id="24" name="TextBox 23"/>
+          <p:cNvSpPr txBox="1"/>
+          <p:nvPr/>
+        </p:nvSpPr>
+        <p:spPr>
+          <a:xfrm>
+            <a:off x="5133140" y="3330253"/>
+            <a:ext cx="564442" cy="276999"/>
+          </a:xfrm>
+          <a:prstGeom prst="rect">
+            <a:avLst/>
+          </a:prstGeom>
+          <a:noFill/>
+        </p:spPr>
+        <p:txBody>
+          <a:bodyPr wrap="square" rtlCol="0">
+            <a:spAutoFit/>
+          </a:bodyPr>
+          <a:lstStyle/>
+          <a:p>
+            <a:r>
+              <a:rPr lang="en-US" sz="600" dirty="0"/>
+              <a:t>Automation +</a:t>
+            </a:r>
+          </a:p>
+        </p:txBody>
+      </p:sp>
+      <p:sp>
+        <p:nvSpPr>
+          <p:cNvPr id="25" name="TextBox 24"/>
+          <p:cNvSpPr txBox="1"/>
+          <p:nvPr/>
+        </p:nvSpPr>
+        <p:spPr>
+          <a:xfrm>
+            <a:off x="2313119" y="1611200"/>
+            <a:ext cx="892161" cy="276999"/>
+          </a:xfrm>
+          <a:prstGeom prst="rect">
+            <a:avLst/>
+          </a:prstGeom>
+          <a:noFill/>
+        </p:spPr>
+        <p:txBody>
+          <a:bodyPr wrap="square" rtlCol="0">
+            <a:spAutoFit/>
+          </a:bodyPr>
+          <a:lstStyle/>
+          <a:p>
+            <a:r>
+              <a:rPr lang="en-US" sz="600" dirty="0"/>
+              <a:t>subnet-WAF-</a:t>
+            </a:r>
+            <a:r>
+              <a:rPr lang="en-US" sz="600" dirty="0" err="1"/>
+              <a:t>appGateway</a:t>
+            </a:r>
+            <a:endParaRPr lang="en-US" sz="600" dirty="0"/>
+          </a:p>
+        </p:txBody>
+      </p:sp>
+      <p:sp>
+        <p:nvSpPr>
+          <p:cNvPr id="26" name="TextBox 25"/>
+          <p:cNvSpPr txBox="1"/>
+          <p:nvPr/>
+        </p:nvSpPr>
+        <p:spPr>
+          <a:xfrm>
+            <a:off x="3841012" y="2699130"/>
+            <a:ext cx="546279" cy="184666"/>
+          </a:xfrm>
+          <a:prstGeom prst="rect">
+            <a:avLst/>
+          </a:prstGeom>
+          <a:noFill/>
+        </p:spPr>
+        <p:txBody>
+          <a:bodyPr wrap="square" rtlCol="0">
+            <a:spAutoFit/>
+          </a:bodyPr>
+          <a:lstStyle/>
+          <a:p>
+            <a:r>
+              <a:rPr lang="en-US" sz="600" dirty="0" err="1"/>
+              <a:t>nsg</a:t>
+            </a:r>
+            <a:r>
+              <a:rPr lang="en-US" sz="600" dirty="0"/>
+              <a:t>-ASE</a:t>
+            </a:r>
+          </a:p>
+        </p:txBody>
+      </p:sp>
+      <p:sp>
+        <p:nvSpPr>
+          <p:cNvPr id="27" name="TextBox 26"/>
+          <p:cNvSpPr txBox="1"/>
+          <p:nvPr/>
+        </p:nvSpPr>
+        <p:spPr>
+          <a:xfrm>
+            <a:off x="3767464" y="1738249"/>
+            <a:ext cx="689051" cy="276999"/>
+          </a:xfrm>
+          <a:prstGeom prst="rect">
+            <a:avLst/>
+          </a:prstGeom>
+          <a:noFill/>
+        </p:spPr>
+        <p:txBody>
+          <a:bodyPr wrap="square" rtlCol="0">
+            <a:spAutoFit/>
+          </a:bodyPr>
+          <a:lstStyle/>
+          <a:p>
+            <a:r>
+              <a:rPr lang="en-US" sz="600" dirty="0" err="1"/>
+              <a:t>nsg-appGateway</a:t>
+            </a:r>
+            <a:endParaRPr lang="en-US" sz="600" dirty="0"/>
+          </a:p>
+        </p:txBody>
+      </p:sp>
+      <p:sp>
+        <p:nvSpPr>
+          <p:cNvPr id="28" name="TextBox 27"/>
+          <p:cNvSpPr txBox="1"/>
+          <p:nvPr/>
+        </p:nvSpPr>
+        <p:spPr>
+          <a:xfrm>
+            <a:off x="2145100" y="1245956"/>
+            <a:ext cx="720395" cy="184666"/>
+          </a:xfrm>
+          <a:prstGeom prst="rect">
+            <a:avLst/>
+          </a:prstGeom>
+          <a:noFill/>
+        </p:spPr>
+        <p:txBody>
+          <a:bodyPr wrap="square" rtlCol="0">
+            <a:spAutoFit/>
+          </a:bodyPr>
+          <a:lstStyle/>
+          <a:p>
+            <a:r>
+              <a:rPr lang="en-US" sz="600" b="1" dirty="0"/>
+              <a:t>Resource Group</a:t>
+            </a:r>
+          </a:p>
+        </p:txBody>
+      </p:sp>
+      <p:sp>
+        <p:nvSpPr>
+          <p:cNvPr id="29" name="TextBox 28"/>
+          <p:cNvSpPr txBox="1"/>
+          <p:nvPr/>
+        </p:nvSpPr>
+        <p:spPr>
+          <a:xfrm>
+            <a:off x="2189065" y="1464924"/>
+            <a:ext cx="605972" cy="276999"/>
+          </a:xfrm>
+          <a:prstGeom prst="rect">
+            <a:avLst/>
+          </a:prstGeom>
+          <a:noFill/>
+        </p:spPr>
+        <p:txBody>
+          <a:bodyPr wrap="square" rtlCol="0">
+            <a:spAutoFit/>
+          </a:bodyPr>
+          <a:lstStyle/>
+          <a:p>
+            <a:r>
+              <a:rPr lang="en-US" sz="600" b="1" dirty="0" err="1"/>
+              <a:t>vNet-pci-paas</a:t>
+            </a:r>
+            <a:endParaRPr lang="en-US" sz="600" b="1" dirty="0"/>
+          </a:p>
+        </p:txBody>
+      </p:sp>
+      <p:pic>
+        <p:nvPicPr>
+          <p:cNvPr id="30" name="Picture 29"/>
+          <p:cNvPicPr>
+            <a:picLocks noChangeAspect="1"/>
+          </p:cNvPicPr>
+          <p:nvPr/>
+        </p:nvPicPr>
+        <p:blipFill>
+          <a:blip r:embed="rId12">
+            <a:extLst>
+              <a:ext uri="{28A0092B-C50C-407E-A947-70E740481C1C}">
+                <a14:useLocalDpi xmlns:a14="http://schemas.microsoft.com/office/drawing/2010/main" val="0"/>
+              </a:ext>
+            </a:extLst>
+          </a:blip>
+          <a:stretch>
+            <a:fillRect/>
+          </a:stretch>
+        </p:blipFill>
+        <p:spPr>
+          <a:xfrm>
+            <a:off x="2106136" y="1468699"/>
+            <a:ext cx="161724" cy="161724"/>
+          </a:xfrm>
+          <a:prstGeom prst="rect">
+            <a:avLst/>
+          </a:prstGeom>
+        </p:spPr>
+      </p:pic>
+      <p:pic>
+        <p:nvPicPr>
+          <p:cNvPr id="31" name="Picture 30"/>
+          <p:cNvPicPr>
+            <a:picLocks noChangeAspect="1"/>
+          </p:cNvPicPr>
+          <p:nvPr/>
+        </p:nvPicPr>
+        <p:blipFill>
+          <a:blip r:embed="rId13">
+            <a:extLst>
+              <a:ext uri="{28A0092B-C50C-407E-A947-70E740481C1C}">
+                <a14:useLocalDpi xmlns:a14="http://schemas.microsoft.com/office/drawing/2010/main" val="0"/>
+              </a:ext>
+            </a:extLst>
+          </a:blip>
+          <a:stretch>
+            <a:fillRect/>
+          </a:stretch>
+        </p:blipFill>
+        <p:spPr>
+          <a:xfrm>
+            <a:off x="2992367" y="3711661"/>
+            <a:ext cx="161824" cy="161824"/>
+          </a:xfrm>
+          <a:prstGeom prst="rect">
+            <a:avLst/>
+          </a:prstGeom>
+        </p:spPr>
+      </p:pic>
+      <p:sp>
+        <p:nvSpPr>
+          <p:cNvPr id="32" name="TextBox 31"/>
+          <p:cNvSpPr txBox="1"/>
+          <p:nvPr/>
+        </p:nvSpPr>
+        <p:spPr>
+          <a:xfrm>
+            <a:off x="3039033" y="3757344"/>
+            <a:ext cx="708405" cy="184666"/>
+          </a:xfrm>
+          <a:prstGeom prst="rect">
+            <a:avLst/>
+          </a:prstGeom>
+          <a:noFill/>
+        </p:spPr>
+        <p:txBody>
+          <a:bodyPr wrap="square" rtlCol="0">
+            <a:spAutoFit/>
+          </a:bodyPr>
+          <a:lstStyle/>
+          <a:p>
+            <a:r>
+              <a:rPr lang="en-US" sz="600" dirty="0"/>
+              <a:t>App Insights</a:t>
+            </a:r>
+          </a:p>
+        </p:txBody>
+      </p:sp>
+      <p:pic>
+        <p:nvPicPr>
+          <p:cNvPr id="33" name="Picture 32"/>
+          <p:cNvPicPr>
+            <a:picLocks noChangeAspect="1"/>
+          </p:cNvPicPr>
+          <p:nvPr/>
+        </p:nvPicPr>
+        <p:blipFill>
+          <a:blip r:embed="rId14">
+            <a:extLst>
+              <a:ext uri="{28A0092B-C50C-407E-A947-70E740481C1C}">
+                <a14:useLocalDpi xmlns:a14="http://schemas.microsoft.com/office/drawing/2010/main" val="0"/>
+              </a:ext>
+            </a:extLst>
+          </a:blip>
+          <a:stretch>
+            <a:fillRect/>
+          </a:stretch>
+        </p:blipFill>
+        <p:spPr>
+          <a:xfrm>
+            <a:off x="4471063" y="4676464"/>
+            <a:ext cx="337054" cy="337054"/>
+          </a:xfrm>
+          <a:prstGeom prst="rect">
+            <a:avLst/>
+          </a:prstGeom>
+        </p:spPr>
+      </p:pic>
+      <p:cxnSp>
+        <p:nvCxnSpPr>
+          <p:cNvPr id="34" name="Straight Arrow Connector 33"/>
+          <p:cNvCxnSpPr>
+            <a:cxnSpLocks/>
+            <a:stCxn id="14" idx="2"/>
+            <a:endCxn id="90" idx="0"/>
+          </p:cNvCxnSpPr>
+          <p:nvPr/>
+        </p:nvCxnSpPr>
+        <p:spPr>
+          <a:xfrm flipH="1">
+            <a:off x="3108186" y="2535270"/>
+            <a:ext cx="20061" cy="409415"/>
+          </a:xfrm>
+          <a:prstGeom prst="straightConnector1">
+            <a:avLst/>
+          </a:prstGeom>
+          <a:ln w="19050">
+            <a:solidFill>
+              <a:schemeClr val="accent2"/>
+            </a:solidFill>
+            <a:tailEnd type="triangle"/>
+          </a:ln>
+        </p:spPr>
+        <p:style>
+          <a:lnRef idx="1">
+            <a:schemeClr val="accent1"/>
+          </a:lnRef>
+          <a:fillRef idx="0">
+            <a:schemeClr val="accent1"/>
+          </a:fillRef>
+          <a:effectRef idx="0">
+            <a:schemeClr val="accent1"/>
+          </a:effectRef>
+          <a:fontRef idx="minor">
+            <a:schemeClr val="tx1"/>
+          </a:fontRef>
+        </p:style>
+      </p:cxnSp>
+      <p:cxnSp>
+        <p:nvCxnSpPr>
+          <p:cNvPr id="35" name="Straight Arrow Connector 34"/>
+          <p:cNvCxnSpPr>
+            <a:cxnSpLocks/>
+            <a:stCxn id="31" idx="3"/>
+            <a:endCxn id="21" idx="1"/>
+          </p:cNvCxnSpPr>
+          <p:nvPr/>
+        </p:nvCxnSpPr>
+        <p:spPr>
+          <a:xfrm flipV="1">
+            <a:off x="3154191" y="3791984"/>
+            <a:ext cx="2009045" cy="589"/>
+          </a:xfrm>
+          <a:prstGeom prst="straightConnector1">
+            <a:avLst/>
+          </a:prstGeom>
+          <a:ln>
+            <a:prstDash val="dashDot"/>
+            <a:tailEnd type="triangle"/>
+          </a:ln>
+        </p:spPr>
+        <p:style>
+          <a:lnRef idx="1">
+            <a:schemeClr val="accent1"/>
+          </a:lnRef>
+          <a:fillRef idx="0">
+            <a:schemeClr val="accent1"/>
+          </a:fillRef>
+          <a:effectRef idx="0">
+            <a:schemeClr val="accent1"/>
+          </a:effectRef>
+          <a:fontRef idx="minor">
+            <a:schemeClr val="tx1"/>
+          </a:fontRef>
+        </p:style>
+      </p:cxnSp>
+      <p:sp>
+        <p:nvSpPr>
+          <p:cNvPr id="36" name="TextBox 35"/>
+          <p:cNvSpPr txBox="1"/>
+          <p:nvPr/>
+        </p:nvSpPr>
+        <p:spPr>
+          <a:xfrm rot="20201567">
+            <a:off x="3827335" y="3435487"/>
+            <a:ext cx="469092" cy="276999"/>
+          </a:xfrm>
+          <a:prstGeom prst="rect">
+            <a:avLst/>
+          </a:prstGeom>
+          <a:noFill/>
+        </p:spPr>
+        <p:txBody>
+          <a:bodyPr wrap="square" rtlCol="0">
+            <a:spAutoFit/>
+          </a:bodyPr>
+          <a:lstStyle/>
+          <a:p>
+            <a:r>
+              <a:rPr lang="en-US" sz="600" dirty="0"/>
+              <a:t>Pull metrics</a:t>
+            </a:r>
+          </a:p>
+        </p:txBody>
+      </p:sp>
+      <p:sp>
+        <p:nvSpPr>
+          <p:cNvPr id="37" name="TextBox 36"/>
+          <p:cNvSpPr txBox="1"/>
+          <p:nvPr/>
+        </p:nvSpPr>
+        <p:spPr>
+          <a:xfrm rot="19143378">
+            <a:off x="6111155" y="2906545"/>
+            <a:ext cx="852423" cy="200055"/>
+          </a:xfrm>
+          <a:prstGeom prst="rect">
+            <a:avLst/>
+          </a:prstGeom>
+          <a:noFill/>
+        </p:spPr>
+        <p:txBody>
+          <a:bodyPr wrap="square" rtlCol="0">
+            <a:spAutoFit/>
+          </a:bodyPr>
+          <a:lstStyle/>
+          <a:p>
+            <a:r>
+              <a:rPr lang="en-US" sz="700" dirty="0"/>
+              <a:t>Ingest metrics</a:t>
+            </a:r>
+          </a:p>
+        </p:txBody>
+      </p:sp>
+      <p:cxnSp>
+        <p:nvCxnSpPr>
+          <p:cNvPr id="38" name="Connector: Elbow 37"/>
+          <p:cNvCxnSpPr>
+            <a:cxnSpLocks/>
+            <a:stCxn id="17" idx="2"/>
+            <a:endCxn id="47" idx="2"/>
+          </p:cNvCxnSpPr>
+          <p:nvPr/>
+        </p:nvCxnSpPr>
+        <p:spPr>
+          <a:xfrm rot="16200000" flipH="1">
+            <a:off x="5103568" y="1484777"/>
+            <a:ext cx="86969" cy="4841358"/>
+          </a:xfrm>
+          <a:prstGeom prst="bentConnector3">
+            <a:avLst>
+              <a:gd name="adj1" fmla="val 678275"/>
+            </a:avLst>
+          </a:prstGeom>
+          <a:ln w="19050">
+            <a:solidFill>
+              <a:schemeClr val="accent2"/>
+            </a:solidFill>
+            <a:tailEnd type="triangle"/>
+          </a:ln>
+        </p:spPr>
+        <p:style>
+          <a:lnRef idx="1">
+            <a:schemeClr val="accent1"/>
+          </a:lnRef>
+          <a:fillRef idx="0">
+            <a:schemeClr val="accent1"/>
+          </a:fillRef>
+          <a:effectRef idx="0">
+            <a:schemeClr val="accent1"/>
+          </a:effectRef>
+          <a:fontRef idx="minor">
+            <a:schemeClr val="tx1"/>
+          </a:fontRef>
+        </p:style>
+      </p:cxnSp>
+      <p:pic>
+        <p:nvPicPr>
+          <p:cNvPr id="39" name="Picture 38"/>
+          <p:cNvPicPr>
+            <a:picLocks noChangeAspect="1"/>
+          </p:cNvPicPr>
+          <p:nvPr/>
+        </p:nvPicPr>
+        <p:blipFill>
+          <a:blip r:embed="rId15">
+            <a:extLst>
+              <a:ext uri="{28A0092B-C50C-407E-A947-70E740481C1C}">
+                <a14:useLocalDpi xmlns:a14="http://schemas.microsoft.com/office/drawing/2010/main" val="0"/>
+              </a:ext>
+            </a:extLst>
+          </a:blip>
+          <a:stretch>
+            <a:fillRect/>
+          </a:stretch>
+        </p:blipFill>
+        <p:spPr>
+          <a:xfrm>
+            <a:off x="2867404" y="4678223"/>
+            <a:ext cx="391406" cy="391406"/>
+          </a:xfrm>
+          <a:prstGeom prst="rect">
+            <a:avLst/>
+          </a:prstGeom>
+        </p:spPr>
+      </p:pic>
+      <p:pic>
+        <p:nvPicPr>
+          <p:cNvPr id="40" name="Picture 39" descr="Making Security Shiny - The Blog of Tom Webster"/>
+          <p:cNvPicPr>
+            <a:picLocks noChangeAspect="1"/>
+          </p:cNvPicPr>
+          <p:nvPr/>
+        </p:nvPicPr>
+        <p:blipFill>
+          <a:blip r:embed="rId16">
+            <a:extLst>
+              <a:ext uri="{28A0092B-C50C-407E-A947-70E740481C1C}">
+                <a14:useLocalDpi xmlns:a14="http://schemas.microsoft.com/office/drawing/2010/main" val="0"/>
+              </a:ext>
+            </a:extLst>
+          </a:blip>
+          <a:stretch>
+            <a:fillRect/>
+          </a:stretch>
+        </p:blipFill>
+        <p:spPr>
+          <a:xfrm>
+            <a:off x="3211049" y="4693079"/>
+            <a:ext cx="206343" cy="196893"/>
+          </a:xfrm>
+          <a:prstGeom prst="rect">
+            <a:avLst/>
+          </a:prstGeom>
+        </p:spPr>
+      </p:pic>
+      <p:sp>
+        <p:nvSpPr>
+          <p:cNvPr id="41" name="TextBox 40"/>
+          <p:cNvSpPr txBox="1"/>
+          <p:nvPr/>
+        </p:nvSpPr>
+        <p:spPr>
+          <a:xfrm>
+            <a:off x="3211046" y="4810869"/>
+            <a:ext cx="543398" cy="276999"/>
+          </a:xfrm>
+          <a:prstGeom prst="rect">
+            <a:avLst/>
+          </a:prstGeom>
+          <a:noFill/>
+        </p:spPr>
+        <p:txBody>
+          <a:bodyPr wrap="square" rtlCol="0">
+            <a:spAutoFit/>
+          </a:bodyPr>
+          <a:lstStyle/>
+          <a:p>
+            <a:r>
+              <a:rPr lang="en-US" sz="600" dirty="0"/>
+              <a:t>Keys and Secrets</a:t>
+            </a:r>
+          </a:p>
+        </p:txBody>
+      </p:sp>
+      <p:cxnSp>
+        <p:nvCxnSpPr>
+          <p:cNvPr id="42" name="Straight Arrow Connector 41"/>
+          <p:cNvCxnSpPr>
+            <a:cxnSpLocks/>
+            <a:endCxn id="63" idx="2"/>
+          </p:cNvCxnSpPr>
+          <p:nvPr/>
+        </p:nvCxnSpPr>
+        <p:spPr>
+          <a:xfrm flipH="1" flipV="1">
+            <a:off x="7564132" y="2645635"/>
+            <a:ext cx="12746" cy="610264"/>
+          </a:xfrm>
+          <a:prstGeom prst="straightConnector1">
+            <a:avLst/>
+          </a:prstGeom>
+          <a:ln>
+            <a:tailEnd type="triangle"/>
+          </a:ln>
+        </p:spPr>
+        <p:style>
+          <a:lnRef idx="1">
+            <a:schemeClr val="accent1"/>
+          </a:lnRef>
+          <a:fillRef idx="0">
+            <a:schemeClr val="accent1"/>
+          </a:fillRef>
+          <a:effectRef idx="0">
+            <a:schemeClr val="accent1"/>
+          </a:effectRef>
+          <a:fontRef idx="minor">
+            <a:schemeClr val="tx1"/>
+          </a:fontRef>
+        </p:style>
+      </p:cxnSp>
+      <p:grpSp>
+        <p:nvGrpSpPr>
+          <p:cNvPr id="43" name="Group 42"/>
+          <p:cNvGrpSpPr/>
+          <p:nvPr/>
+        </p:nvGrpSpPr>
+        <p:grpSpPr>
+          <a:xfrm>
+            <a:off x="7016772" y="2918296"/>
+            <a:ext cx="1104021" cy="1030647"/>
+            <a:chOff x="6916499" y="3022407"/>
+            <a:chExt cx="1104021" cy="1030647"/>
+          </a:xfrm>
+        </p:grpSpPr>
+        <p:sp>
+          <p:nvSpPr>
+            <p:cNvPr id="44" name="Rectangle: Rounded Corners 43"/>
+            <p:cNvSpPr/>
+            <p:nvPr/>
+          </p:nvSpPr>
+          <p:spPr>
+            <a:xfrm>
+              <a:off x="6916499" y="3381175"/>
+              <a:ext cx="1104021" cy="650715"/>
+            </a:xfrm>
+            <a:prstGeom prst="roundRect">
+              <a:avLst>
+                <a:gd name="adj" fmla="val 4803"/>
+              </a:avLst>
+            </a:prstGeom>
+            <a:solidFill>
+              <a:schemeClr val="bg1">
+                <a:lumMod val="95000"/>
+              </a:schemeClr>
+            </a:solidFill>
+            <a:ln w="12700">
+              <a:prstDash val="sysDot"/>
+            </a:ln>
+          </p:spPr>
+          <p:style>
+            <a:lnRef idx="2">
+              <a:schemeClr val="accent3"/>
+            </a:lnRef>
+            <a:fillRef idx="1">
+              <a:schemeClr val="lt1"/>
+            </a:fillRef>
+            <a:effectRef idx="0">
+              <a:schemeClr val="accent3"/>
+            </a:effectRef>
+            <a:fontRef idx="minor">
+              <a:schemeClr val="dk1"/>
+            </a:fontRef>
+          </p:style>
+          <p:txBody>
+            <a:bodyPr rtlCol="0" anchor="ctr"/>
+            <a:lstStyle/>
+            <a:p>
+              <a:pPr algn="ctr"/>
+              <a:endParaRPr lang="en-US" sz="2400"/>
+            </a:p>
+          </p:txBody>
+        </p:sp>
+        <p:pic>
+          <p:nvPicPr>
+            <p:cNvPr id="45" name="Picture 44"/>
+            <p:cNvPicPr>
+              <a:picLocks noChangeAspect="1"/>
+            </p:cNvPicPr>
+            <p:nvPr/>
+          </p:nvPicPr>
+          <p:blipFill>
+            <a:blip r:embed="rId17">
+              <a:extLst>
+                <a:ext uri="{28A0092B-C50C-407E-A947-70E740481C1C}">
+                  <a14:useLocalDpi xmlns:a14="http://schemas.microsoft.com/office/drawing/2010/main" val="0"/>
+                </a:ext>
+              </a:extLst>
+            </a:blip>
+            <a:stretch>
+              <a:fillRect/>
+            </a:stretch>
+          </p:blipFill>
+          <p:spPr>
+            <a:xfrm>
+              <a:off x="7303257" y="3460712"/>
+              <a:ext cx="328398" cy="328398"/>
+            </a:xfrm>
+            <a:prstGeom prst="rect">
+              <a:avLst/>
+            </a:prstGeom>
+          </p:spPr>
+        </p:pic>
+        <p:sp>
+          <p:nvSpPr>
+            <p:cNvPr id="46" name="TextBox 45"/>
+            <p:cNvSpPr txBox="1"/>
+            <p:nvPr/>
+          </p:nvSpPr>
+          <p:spPr>
+            <a:xfrm>
+              <a:off x="7434589" y="3649874"/>
+              <a:ext cx="421570" cy="184666"/>
+            </a:xfrm>
+            <a:prstGeom prst="rect">
+              <a:avLst/>
+            </a:prstGeom>
+            <a:noFill/>
+          </p:spPr>
+          <p:txBody>
+            <a:bodyPr wrap="square" rtlCol="0">
+              <a:spAutoFit/>
+            </a:bodyPr>
+            <a:lstStyle/>
+            <a:p>
+              <a:r>
+                <a:rPr lang="en-US" sz="600" dirty="0"/>
+                <a:t>SQL DB</a:t>
+              </a:r>
+            </a:p>
+          </p:txBody>
+        </p:sp>
+        <p:pic>
+          <p:nvPicPr>
+            <p:cNvPr id="47" name="Picture 46"/>
+            <p:cNvPicPr>
+              <a:picLocks noChangeAspect="1"/>
+            </p:cNvPicPr>
+            <p:nvPr/>
+          </p:nvPicPr>
+          <p:blipFill>
+            <a:blip r:embed="rId7"/>
+            <a:stretch>
+              <a:fillRect/>
+            </a:stretch>
+          </p:blipFill>
+          <p:spPr>
+            <a:xfrm>
+              <a:off x="7136012" y="3857326"/>
+              <a:ext cx="662892" cy="195728"/>
+            </a:xfrm>
+            <a:prstGeom prst="rect">
+              <a:avLst/>
+            </a:prstGeom>
+          </p:spPr>
+        </p:pic>
+        <p:sp>
+          <p:nvSpPr>
+            <p:cNvPr id="48" name="TextBox 47"/>
+            <p:cNvSpPr txBox="1"/>
+            <p:nvPr/>
+          </p:nvSpPr>
+          <p:spPr>
+            <a:xfrm>
+              <a:off x="7246330" y="3022407"/>
+              <a:ext cx="376517" cy="276999"/>
+            </a:xfrm>
+            <a:prstGeom prst="rect">
+              <a:avLst/>
+            </a:prstGeom>
+            <a:noFill/>
+          </p:spPr>
+          <p:txBody>
+            <a:bodyPr wrap="square" rtlCol="0">
+              <a:spAutoFit/>
+            </a:bodyPr>
+            <a:lstStyle/>
+            <a:p>
+              <a:r>
+                <a:rPr lang="en-US" sz="600" dirty="0"/>
+                <a:t>Ops Logs</a:t>
+              </a:r>
+            </a:p>
+          </p:txBody>
+        </p:sp>
+      </p:grpSp>
+      <p:pic>
+        <p:nvPicPr>
+          <p:cNvPr id="49" name="Picture 48" descr="multiple user icons different colors - vector Clip Art"/>
+          <p:cNvPicPr>
+            <a:picLocks noChangeAspect="1"/>
+          </p:cNvPicPr>
+          <p:nvPr/>
+        </p:nvPicPr>
+        <p:blipFill>
+          <a:blip r:embed="rId18">
+            <a:extLst>
+              <a:ext uri="{28A0092B-C50C-407E-A947-70E740481C1C}">
+                <a14:useLocalDpi xmlns:a14="http://schemas.microsoft.com/office/drawing/2010/main" val="0"/>
+              </a:ext>
+            </a:extLst>
+          </a:blip>
+          <a:stretch>
+            <a:fillRect/>
+          </a:stretch>
+        </p:blipFill>
+        <p:spPr>
+          <a:xfrm>
+            <a:off x="2980280" y="396341"/>
+            <a:ext cx="225000" cy="241875"/>
+          </a:xfrm>
+          <a:prstGeom prst="rect">
+            <a:avLst/>
+          </a:prstGeom>
+        </p:spPr>
+      </p:pic>
+      <p:sp>
+        <p:nvSpPr>
+          <p:cNvPr id="50" name="TextBox 49"/>
+          <p:cNvSpPr txBox="1"/>
+          <p:nvPr/>
+        </p:nvSpPr>
+        <p:spPr>
+          <a:xfrm>
+            <a:off x="2456441" y="607138"/>
+            <a:ext cx="695271" cy="276999"/>
+          </a:xfrm>
+          <a:prstGeom prst="rect">
+            <a:avLst/>
+          </a:prstGeom>
+          <a:noFill/>
+        </p:spPr>
+        <p:txBody>
+          <a:bodyPr wrap="square" rtlCol="0">
+            <a:spAutoFit/>
+          </a:bodyPr>
+          <a:lstStyle/>
+          <a:p>
+            <a:r>
+              <a:rPr lang="en-US" sz="600" dirty="0"/>
+              <a:t>Customer / Cardholder</a:t>
+            </a:r>
+          </a:p>
+        </p:txBody>
+      </p:sp>
+      <p:cxnSp>
+        <p:nvCxnSpPr>
+          <p:cNvPr id="51" name="Straight Arrow Connector 50"/>
+          <p:cNvCxnSpPr>
+            <a:cxnSpLocks/>
+            <a:endCxn id="15" idx="0"/>
+          </p:cNvCxnSpPr>
+          <p:nvPr/>
+        </p:nvCxnSpPr>
+        <p:spPr>
+          <a:xfrm>
+            <a:off x="3104932" y="870338"/>
+            <a:ext cx="7828" cy="1031033"/>
+          </a:xfrm>
+          <a:prstGeom prst="straightConnector1">
+            <a:avLst/>
+          </a:prstGeom>
+          <a:ln w="19050">
+            <a:solidFill>
+              <a:schemeClr val="accent2"/>
+            </a:solidFill>
+            <a:tailEnd type="triangle"/>
+          </a:ln>
+        </p:spPr>
+        <p:style>
+          <a:lnRef idx="1">
+            <a:schemeClr val="accent1"/>
+          </a:lnRef>
+          <a:fillRef idx="0">
+            <a:schemeClr val="accent1"/>
+          </a:fillRef>
+          <a:effectRef idx="0">
+            <a:schemeClr val="accent1"/>
+          </a:effectRef>
+          <a:fontRef idx="minor">
+            <a:schemeClr val="tx1"/>
+          </a:fontRef>
+        </p:style>
+      </p:cxnSp>
+      <p:pic>
+        <p:nvPicPr>
+          <p:cNvPr id="52" name="Picture 51"/>
+          <p:cNvPicPr>
+            <a:picLocks noChangeAspect="1"/>
+          </p:cNvPicPr>
+          <p:nvPr/>
+        </p:nvPicPr>
+        <p:blipFill>
+          <a:blip r:embed="rId19"/>
+          <a:stretch>
+            <a:fillRect/>
+          </a:stretch>
+        </p:blipFill>
+        <p:spPr>
+          <a:xfrm>
+            <a:off x="3215200" y="532215"/>
+            <a:ext cx="653883" cy="445610"/>
+          </a:xfrm>
+          <a:prstGeom prst="rect">
+            <a:avLst/>
+          </a:prstGeom>
+        </p:spPr>
+      </p:pic>
+      <p:pic>
+        <p:nvPicPr>
+          <p:cNvPr id="53" name="Picture 52" descr="透過 Certificate Revocation List + HAProxy 來管理 HTTPS 連線 ..."/>
+          <p:cNvPicPr>
+            <a:picLocks noChangeAspect="1"/>
+          </p:cNvPicPr>
+          <p:nvPr/>
+        </p:nvPicPr>
+        <p:blipFill>
+          <a:blip r:embed="rId20">
+            <a:extLst>
+              <a:ext uri="{28A0092B-C50C-407E-A947-70E740481C1C}">
+                <a14:useLocalDpi xmlns:a14="http://schemas.microsoft.com/office/drawing/2010/main" val="0"/>
+              </a:ext>
+            </a:extLst>
+          </a:blip>
+          <a:stretch>
+            <a:fillRect/>
+          </a:stretch>
+        </p:blipFill>
+        <p:spPr>
+          <a:xfrm>
+            <a:off x="3017293" y="2569443"/>
+            <a:ext cx="113109" cy="131311"/>
+          </a:xfrm>
+          <a:prstGeom prst="rect">
+            <a:avLst/>
+          </a:prstGeom>
+        </p:spPr>
+      </p:pic>
+      <p:pic>
+        <p:nvPicPr>
+          <p:cNvPr id="54" name="Picture 53" descr="透過 Certificate Revocation List + HAProxy 來管理 HTTPS 連線 ..."/>
+          <p:cNvPicPr>
+            <a:picLocks noChangeAspect="1"/>
+          </p:cNvPicPr>
+          <p:nvPr/>
+        </p:nvPicPr>
+        <p:blipFill>
+          <a:blip r:embed="rId20">
+            <a:extLst>
+              <a:ext uri="{28A0092B-C50C-407E-A947-70E740481C1C}">
+                <a14:useLocalDpi xmlns:a14="http://schemas.microsoft.com/office/drawing/2010/main" val="0"/>
+              </a:ext>
+            </a:extLst>
+          </a:blip>
+          <a:stretch>
+            <a:fillRect/>
+          </a:stretch>
+        </p:blipFill>
+        <p:spPr>
+          <a:xfrm>
+            <a:off x="2821153" y="842886"/>
+            <a:ext cx="267840" cy="310942"/>
+          </a:xfrm>
+          <a:prstGeom prst="rect">
+            <a:avLst/>
+          </a:prstGeom>
+        </p:spPr>
+      </p:pic>
+      <p:sp>
+        <p:nvSpPr>
+          <p:cNvPr id="55" name="Arrow: Curved Right 54"/>
+          <p:cNvSpPr/>
+          <p:nvPr/>
+        </p:nvSpPr>
+        <p:spPr>
+          <a:xfrm flipH="1">
+            <a:off x="3288414" y="2372225"/>
+            <a:ext cx="221239" cy="762212"/>
+          </a:xfrm>
+          <a:prstGeom prst="curvedRightArrow">
+            <a:avLst/>
+          </a:prstGeom>
+          <a:solidFill>
+            <a:srgbClr val="FFFF00"/>
+          </a:solidFill>
+          <a:ln w="6350">
+            <a:solidFill>
+              <a:schemeClr val="accent4"/>
+            </a:solidFill>
+          </a:ln>
+        </p:spPr>
+        <p:style>
+          <a:lnRef idx="2">
+            <a:schemeClr val="accent1">
+              <a:shade val="50000"/>
+            </a:schemeClr>
+          </a:lnRef>
+          <a:fillRef idx="1">
+            <a:schemeClr val="accent1"/>
+          </a:fillRef>
+          <a:effectRef idx="0">
+            <a:schemeClr val="accent1"/>
+          </a:effectRef>
+          <a:fontRef idx="minor">
+            <a:schemeClr val="lt1"/>
+          </a:fontRef>
+        </p:style>
+        <p:txBody>
+          <a:bodyPr vert="vert" rtlCol="0" anchor="t"/>
+          <a:lstStyle/>
+          <a:p>
+            <a:endParaRPr lang="en-US" sz="800" dirty="0">
+              <a:solidFill>
+                <a:schemeClr val="tx1"/>
+              </a:solidFill>
+            </a:endParaRPr>
+          </a:p>
+        </p:txBody>
+      </p:sp>
+      <p:pic>
+        <p:nvPicPr>
+          <p:cNvPr id="56" name="Picture 55"/>
+          <p:cNvPicPr>
+            <a:picLocks noChangeAspect="1"/>
+          </p:cNvPicPr>
+          <p:nvPr/>
+        </p:nvPicPr>
+        <p:blipFill>
+          <a:blip r:embed="rId5"/>
+          <a:stretch>
+            <a:fillRect/>
+          </a:stretch>
+        </p:blipFill>
+        <p:spPr>
+          <a:xfrm>
+            <a:off x="3881199" y="2569441"/>
+            <a:ext cx="288727" cy="238000"/>
+          </a:xfrm>
+          <a:prstGeom prst="rect">
+            <a:avLst/>
+          </a:prstGeom>
+        </p:spPr>
+      </p:pic>
+      <p:sp>
+        <p:nvSpPr>
+          <p:cNvPr id="57" name="Rectangle 56"/>
+          <p:cNvSpPr/>
+          <p:nvPr/>
+        </p:nvSpPr>
+        <p:spPr>
+          <a:xfrm>
+            <a:off x="3366713" y="2335706"/>
+            <a:ext cx="513490" cy="338554"/>
+          </a:xfrm>
+          <a:prstGeom prst="rect">
+            <a:avLst/>
+          </a:prstGeom>
+        </p:spPr>
+        <p:txBody>
+          <a:bodyPr wrap="square">
+            <a:spAutoFit/>
+          </a:bodyPr>
+          <a:lstStyle/>
+          <a:p>
+            <a:r>
+              <a:rPr lang="en-GB" sz="800" dirty="0"/>
+              <a:t>Custom probe</a:t>
+            </a:r>
+            <a:endParaRPr lang="en-US" sz="800" dirty="0"/>
+          </a:p>
+        </p:txBody>
+      </p:sp>
+      <p:pic>
+        <p:nvPicPr>
+          <p:cNvPr id="58" name="Picture 57"/>
+          <p:cNvPicPr>
+            <a:picLocks noChangeAspect="1"/>
+          </p:cNvPicPr>
+          <p:nvPr/>
+        </p:nvPicPr>
+        <p:blipFill>
+          <a:blip r:embed="rId21">
+            <a:extLst>
+              <a:ext uri="{28A0092B-C50C-407E-A947-70E740481C1C}">
+                <a14:useLocalDpi xmlns:a14="http://schemas.microsoft.com/office/drawing/2010/main" val="0"/>
+              </a:ext>
+            </a:extLst>
+          </a:blip>
+          <a:stretch>
+            <a:fillRect/>
+          </a:stretch>
+        </p:blipFill>
+        <p:spPr>
+          <a:xfrm>
+            <a:off x="212873" y="1842173"/>
+            <a:ext cx="390145" cy="390145"/>
+          </a:xfrm>
+          <a:prstGeom prst="rect">
+            <a:avLst/>
+          </a:prstGeom>
+        </p:spPr>
+      </p:pic>
+      <p:cxnSp>
+        <p:nvCxnSpPr>
+          <p:cNvPr id="59" name="Straight Connector 58"/>
+          <p:cNvCxnSpPr>
+            <a:stCxn id="58" idx="3"/>
+            <a:endCxn id="15" idx="1"/>
+          </p:cNvCxnSpPr>
+          <p:nvPr/>
+        </p:nvCxnSpPr>
+        <p:spPr>
+          <a:xfrm flipV="1">
+            <a:off x="603018" y="2031735"/>
+            <a:ext cx="2157518" cy="5511"/>
+          </a:xfrm>
+          <a:prstGeom prst="line">
+            <a:avLst/>
+          </a:prstGeom>
+          <a:ln>
+            <a:headEnd type="diamond" w="med" len="med"/>
+            <a:tailEnd type="triangle" w="med" len="med"/>
+          </a:ln>
+        </p:spPr>
+        <p:style>
+          <a:lnRef idx="1">
+            <a:schemeClr val="accent1"/>
+          </a:lnRef>
+          <a:fillRef idx="0">
+            <a:schemeClr val="accent1"/>
+          </a:fillRef>
+          <a:effectRef idx="0">
+            <a:schemeClr val="accent1"/>
+          </a:effectRef>
+          <a:fontRef idx="minor">
+            <a:schemeClr val="tx1"/>
+          </a:fontRef>
+        </p:style>
+      </p:cxnSp>
+      <p:cxnSp>
+        <p:nvCxnSpPr>
+          <p:cNvPr id="60" name="Straight Connector 59"/>
+          <p:cNvCxnSpPr>
+            <a:cxnSpLocks/>
+            <a:endCxn id="58" idx="0"/>
+          </p:cNvCxnSpPr>
+          <p:nvPr/>
+        </p:nvCxnSpPr>
+        <p:spPr>
+          <a:xfrm>
+            <a:off x="407945" y="1116990"/>
+            <a:ext cx="1" cy="725183"/>
+          </a:xfrm>
+          <a:prstGeom prst="line">
+            <a:avLst/>
+          </a:prstGeom>
+          <a:ln>
+            <a:headEnd type="diamond" w="med" len="med"/>
+            <a:tailEnd type="triangle" w="med" len="med"/>
+          </a:ln>
+        </p:spPr>
+        <p:style>
+          <a:lnRef idx="1">
+            <a:schemeClr val="accent1"/>
+          </a:lnRef>
+          <a:fillRef idx="0">
+            <a:schemeClr val="accent1"/>
+          </a:fillRef>
+          <a:effectRef idx="0">
+            <a:schemeClr val="accent1"/>
+          </a:effectRef>
+          <a:fontRef idx="minor">
+            <a:schemeClr val="tx1"/>
+          </a:fontRef>
+        </p:style>
+      </p:cxnSp>
+      <p:sp>
+        <p:nvSpPr>
+          <p:cNvPr id="61" name="TextBox 60"/>
+          <p:cNvSpPr txBox="1"/>
+          <p:nvPr/>
+        </p:nvSpPr>
+        <p:spPr>
+          <a:xfrm>
+            <a:off x="205517" y="532215"/>
+            <a:ext cx="1308371" cy="646331"/>
+          </a:xfrm>
+          <a:prstGeom prst="rect">
+            <a:avLst/>
+          </a:prstGeom>
+          <a:noFill/>
+        </p:spPr>
+        <p:txBody>
+          <a:bodyPr wrap="none" rtlCol="0">
+            <a:spAutoFit/>
+          </a:bodyPr>
+          <a:lstStyle/>
+          <a:p>
+            <a:r>
+              <a:rPr lang="en-GB" sz="900" b="1" dirty="0"/>
+              <a:t>A record</a:t>
+            </a:r>
+            <a:r>
+              <a:rPr lang="en-GB" sz="900" dirty="0"/>
+              <a:t>: </a:t>
+            </a:r>
+          </a:p>
+          <a:p>
+            <a:r>
+              <a:rPr lang="en-GB" sz="900" dirty="0"/>
+              <a:t>azurepcisamples.com</a:t>
+            </a:r>
+          </a:p>
+          <a:p>
+            <a:r>
+              <a:rPr lang="en-GB" sz="900" dirty="0"/>
+              <a:t>To</a:t>
+            </a:r>
+          </a:p>
+          <a:p>
+            <a:r>
+              <a:rPr lang="en-GB" sz="900" dirty="0"/>
+              <a:t>App Gateway hostname</a:t>
+            </a:r>
+            <a:endParaRPr lang="en-US" sz="900" dirty="0"/>
+          </a:p>
+        </p:txBody>
+      </p:sp>
+      <p:sp>
+        <p:nvSpPr>
+          <p:cNvPr id="62" name="TextBox 61"/>
+          <p:cNvSpPr txBox="1"/>
+          <p:nvPr/>
+        </p:nvSpPr>
+        <p:spPr>
+          <a:xfrm>
+            <a:off x="710473" y="1611340"/>
+            <a:ext cx="1186543" cy="461665"/>
+          </a:xfrm>
+          <a:prstGeom prst="rect">
+            <a:avLst/>
+          </a:prstGeom>
+          <a:noFill/>
+        </p:spPr>
+        <p:txBody>
+          <a:bodyPr wrap="none" rtlCol="0">
+            <a:spAutoFit/>
+          </a:bodyPr>
+          <a:lstStyle/>
+          <a:p>
+            <a:r>
+              <a:rPr lang="en-GB" sz="800" b="1" dirty="0"/>
+              <a:t>External Public IP</a:t>
+            </a:r>
+            <a:r>
+              <a:rPr lang="en-GB" sz="800" dirty="0"/>
+              <a:t>: </a:t>
+            </a:r>
+          </a:p>
+          <a:p>
+            <a:r>
+              <a:rPr lang="en-GB" sz="800" dirty="0"/>
+              <a:t>Mapped to </a:t>
+            </a:r>
+          </a:p>
+          <a:p>
+            <a:r>
+              <a:rPr lang="en-GB" sz="800" dirty="0"/>
+              <a:t>App Gateway hostname</a:t>
+            </a:r>
+            <a:endParaRPr lang="en-US" sz="800" dirty="0"/>
+          </a:p>
+        </p:txBody>
+      </p:sp>
+      <p:sp>
+        <p:nvSpPr>
+          <p:cNvPr id="63" name="Rectangle: Rounded Corners 62"/>
+          <p:cNvSpPr/>
+          <p:nvPr/>
+        </p:nvSpPr>
+        <p:spPr>
+          <a:xfrm>
+            <a:off x="7022979" y="1692689"/>
+            <a:ext cx="1082309" cy="952946"/>
+          </a:xfrm>
+          <a:prstGeom prst="roundRect">
+            <a:avLst>
+              <a:gd name="adj" fmla="val 4803"/>
+            </a:avLst>
+          </a:prstGeom>
+          <a:solidFill>
+            <a:schemeClr val="bg1">
+              <a:lumMod val="95000"/>
+            </a:schemeClr>
+          </a:solidFill>
+          <a:ln w="12700">
+            <a:prstDash val="sysDot"/>
+          </a:ln>
+        </p:spPr>
+        <p:style>
+          <a:lnRef idx="2">
+            <a:schemeClr val="accent3"/>
+          </a:lnRef>
+          <a:fillRef idx="1">
+            <a:schemeClr val="lt1"/>
+          </a:fillRef>
+          <a:effectRef idx="0">
+            <a:schemeClr val="accent3"/>
+          </a:effectRef>
+          <a:fontRef idx="minor">
+            <a:schemeClr val="dk1"/>
+          </a:fontRef>
+        </p:style>
+        <p:txBody>
+          <a:bodyPr rtlCol="0" anchor="ctr"/>
+          <a:lstStyle/>
+          <a:p>
+            <a:pPr algn="ctr"/>
+            <a:endParaRPr lang="en-US" sz="2400"/>
+          </a:p>
+        </p:txBody>
+      </p:sp>
+      <p:sp>
+        <p:nvSpPr>
+          <p:cNvPr id="64" name="TextBox 63"/>
+          <p:cNvSpPr txBox="1"/>
+          <p:nvPr/>
+        </p:nvSpPr>
+        <p:spPr>
+          <a:xfrm>
+            <a:off x="4525281" y="4332081"/>
+            <a:ext cx="660758" cy="230832"/>
+          </a:xfrm>
+          <a:prstGeom prst="rect">
+            <a:avLst/>
+          </a:prstGeom>
+          <a:noFill/>
+        </p:spPr>
+        <p:txBody>
+          <a:bodyPr wrap="none" rtlCol="0">
+            <a:spAutoFit/>
+          </a:bodyPr>
+          <a:lstStyle/>
+          <a:p>
+            <a:r>
+              <a:rPr lang="en-GB" sz="900" dirty="0"/>
+              <a:t>Encrypted</a:t>
+            </a:r>
+            <a:endParaRPr lang="en-US" sz="1000" dirty="0"/>
+          </a:p>
+        </p:txBody>
+      </p:sp>
+      <p:cxnSp>
+        <p:nvCxnSpPr>
+          <p:cNvPr id="65" name="Straight Arrow Connector 64"/>
+          <p:cNvCxnSpPr>
+            <a:stCxn id="68" idx="1"/>
+            <a:endCxn id="67" idx="3"/>
+          </p:cNvCxnSpPr>
+          <p:nvPr/>
+        </p:nvCxnSpPr>
+        <p:spPr>
+          <a:xfrm flipH="1" flipV="1">
+            <a:off x="7457820" y="2291790"/>
+            <a:ext cx="255922" cy="9551"/>
+          </a:xfrm>
+          <a:prstGeom prst="straightConnector1">
+            <a:avLst/>
+          </a:prstGeom>
+          <a:ln>
+            <a:tailEnd type="triangle"/>
+          </a:ln>
+        </p:spPr>
+        <p:style>
+          <a:lnRef idx="1">
+            <a:schemeClr val="accent1"/>
+          </a:lnRef>
+          <a:fillRef idx="0">
+            <a:schemeClr val="accent1"/>
+          </a:fillRef>
+          <a:effectRef idx="0">
+            <a:schemeClr val="accent1"/>
+          </a:effectRef>
+          <a:fontRef idx="minor">
+            <a:schemeClr val="tx1"/>
+          </a:fontRef>
+        </p:style>
+      </p:cxnSp>
+      <p:grpSp>
+        <p:nvGrpSpPr>
+          <p:cNvPr id="66" name="Group 65"/>
+          <p:cNvGrpSpPr/>
+          <p:nvPr/>
+        </p:nvGrpSpPr>
+        <p:grpSpPr>
+          <a:xfrm>
+            <a:off x="7068871" y="1518085"/>
+            <a:ext cx="1102527" cy="1213941"/>
+            <a:chOff x="5368718" y="3041299"/>
+            <a:chExt cx="1102527" cy="1213941"/>
+          </a:xfrm>
+        </p:grpSpPr>
+        <p:pic>
+          <p:nvPicPr>
+            <p:cNvPr id="67" name="Picture 66"/>
+            <p:cNvPicPr>
+              <a:picLocks noChangeAspect="1"/>
+            </p:cNvPicPr>
+            <p:nvPr/>
+          </p:nvPicPr>
+          <p:blipFill>
+            <a:blip r:embed="rId22">
+              <a:extLst>
+                <a:ext uri="{28A0092B-C50C-407E-A947-70E740481C1C}">
+                  <a14:useLocalDpi xmlns:a14="http://schemas.microsoft.com/office/drawing/2010/main" val="0"/>
+                </a:ext>
+              </a:extLst>
+            </a:blip>
+            <a:stretch>
+              <a:fillRect/>
+            </a:stretch>
+          </p:blipFill>
+          <p:spPr>
+            <a:xfrm>
+              <a:off x="5513828" y="3693083"/>
+              <a:ext cx="243840" cy="243840"/>
+            </a:xfrm>
+            <a:prstGeom prst="rect">
+              <a:avLst/>
+            </a:prstGeom>
+          </p:spPr>
+        </p:pic>
+        <p:pic>
+          <p:nvPicPr>
+            <p:cNvPr id="68" name="Picture 67" descr="When clicking on the Office 365 dashboard, you can see all activities ..."/>
+            <p:cNvPicPr>
+              <a:picLocks noChangeAspect="1"/>
+            </p:cNvPicPr>
+            <p:nvPr/>
+          </p:nvPicPr>
+          <p:blipFill>
+            <a:blip r:embed="rId23">
+              <a:extLst>
+                <a:ext uri="{28A0092B-C50C-407E-A947-70E740481C1C}">
+                  <a14:useLocalDpi xmlns:a14="http://schemas.microsoft.com/office/drawing/2010/main" val="0"/>
+                </a:ext>
+              </a:extLst>
+            </a:blip>
+            <a:stretch>
+              <a:fillRect/>
+            </a:stretch>
+          </p:blipFill>
+          <p:spPr>
+            <a:xfrm>
+              <a:off x="6013590" y="3735889"/>
+              <a:ext cx="318151" cy="177330"/>
+            </a:xfrm>
+            <a:prstGeom prst="rect">
+              <a:avLst/>
+            </a:prstGeom>
+          </p:spPr>
+        </p:pic>
+        <p:sp>
+          <p:nvSpPr>
+            <p:cNvPr id="69" name="TextBox 68"/>
+            <p:cNvSpPr txBox="1"/>
+            <p:nvPr/>
+          </p:nvSpPr>
+          <p:spPr>
+            <a:xfrm>
+              <a:off x="5959512" y="3978241"/>
+              <a:ext cx="511733" cy="276999"/>
+            </a:xfrm>
+            <a:prstGeom prst="rect">
+              <a:avLst/>
+            </a:prstGeom>
+            <a:noFill/>
+          </p:spPr>
+          <p:txBody>
+            <a:bodyPr wrap="square" rtlCol="0">
+              <a:spAutoFit/>
+            </a:bodyPr>
+            <a:lstStyle/>
+            <a:p>
+              <a:r>
+                <a:rPr lang="en-US" sz="600" dirty="0"/>
+                <a:t>Dashboards</a:t>
+              </a:r>
+            </a:p>
+          </p:txBody>
+        </p:sp>
+        <p:sp>
+          <p:nvSpPr>
+            <p:cNvPr id="70" name="TextBox 69"/>
+            <p:cNvSpPr txBox="1"/>
+            <p:nvPr/>
+          </p:nvSpPr>
+          <p:spPr>
+            <a:xfrm>
+              <a:off x="5594387" y="3041299"/>
+              <a:ext cx="815294" cy="338554"/>
+            </a:xfrm>
+            <a:prstGeom prst="rect">
+              <a:avLst/>
+            </a:prstGeom>
+            <a:noFill/>
+          </p:spPr>
+          <p:txBody>
+            <a:bodyPr wrap="square" rtlCol="0">
+              <a:spAutoFit/>
+            </a:bodyPr>
+            <a:lstStyle/>
+            <a:p>
+              <a:r>
+                <a:rPr lang="en-US" sz="800" dirty="0"/>
+                <a:t>OMS Workspace</a:t>
+              </a:r>
+            </a:p>
+          </p:txBody>
+        </p:sp>
+        <p:pic>
+          <p:nvPicPr>
+            <p:cNvPr id="71" name="Picture 70"/>
+            <p:cNvPicPr>
+              <a:picLocks noChangeAspect="1"/>
+            </p:cNvPicPr>
+            <p:nvPr/>
+          </p:nvPicPr>
+          <p:blipFill>
+            <a:blip r:embed="rId24">
+              <a:extLst>
+                <a:ext uri="{28A0092B-C50C-407E-A947-70E740481C1C}">
+                  <a14:useLocalDpi xmlns:a14="http://schemas.microsoft.com/office/drawing/2010/main" val="0"/>
+                </a:ext>
+              </a:extLst>
+            </a:blip>
+            <a:stretch>
+              <a:fillRect/>
+            </a:stretch>
+          </p:blipFill>
+          <p:spPr>
+            <a:xfrm>
+              <a:off x="5368718" y="3061655"/>
+              <a:ext cx="228800" cy="228800"/>
+            </a:xfrm>
+            <a:prstGeom prst="rect">
+              <a:avLst/>
+            </a:prstGeom>
+          </p:spPr>
+        </p:pic>
+        <p:sp>
+          <p:nvSpPr>
+            <p:cNvPr id="72" name="TextBox 71"/>
+            <p:cNvSpPr txBox="1"/>
+            <p:nvPr/>
+          </p:nvSpPr>
+          <p:spPr>
+            <a:xfrm>
+              <a:off x="5388937" y="3968146"/>
+              <a:ext cx="548042" cy="276999"/>
+            </a:xfrm>
+            <a:prstGeom prst="rect">
+              <a:avLst/>
+            </a:prstGeom>
+            <a:noFill/>
+          </p:spPr>
+          <p:txBody>
+            <a:bodyPr wrap="square" rtlCol="0">
+              <a:spAutoFit/>
+            </a:bodyPr>
+            <a:lstStyle/>
+            <a:p>
+              <a:r>
+                <a:rPr lang="en-US" sz="600" dirty="0"/>
+                <a:t>Log Analytics</a:t>
+              </a:r>
+            </a:p>
+          </p:txBody>
+        </p:sp>
+      </p:grpSp>
+      <p:sp>
+        <p:nvSpPr>
+          <p:cNvPr id="73" name="Rectangle: Rounded Corners 72"/>
+          <p:cNvSpPr/>
+          <p:nvPr/>
+        </p:nvSpPr>
+        <p:spPr>
+          <a:xfrm>
+            <a:off x="4722523" y="1884168"/>
+            <a:ext cx="1082309" cy="952946"/>
+          </a:xfrm>
+          <a:prstGeom prst="roundRect">
+            <a:avLst>
+              <a:gd name="adj" fmla="val 4803"/>
+            </a:avLst>
+          </a:prstGeom>
+          <a:solidFill>
+            <a:schemeClr val="bg1">
+              <a:lumMod val="95000"/>
+            </a:schemeClr>
+          </a:solidFill>
+          <a:ln w="12700">
+            <a:prstDash val="sysDot"/>
+          </a:ln>
+        </p:spPr>
+        <p:style>
+          <a:lnRef idx="2">
+            <a:schemeClr val="accent3"/>
+          </a:lnRef>
+          <a:fillRef idx="1">
+            <a:schemeClr val="lt1"/>
+          </a:fillRef>
+          <a:effectRef idx="0">
+            <a:schemeClr val="accent3"/>
+          </a:effectRef>
+          <a:fontRef idx="minor">
+            <a:schemeClr val="dk1"/>
+          </a:fontRef>
+        </p:style>
+        <p:txBody>
+          <a:bodyPr rtlCol="0" anchor="ctr"/>
+          <a:lstStyle/>
+          <a:p>
+            <a:pPr algn="ctr"/>
+            <a:endParaRPr lang="en-US" sz="2400"/>
+          </a:p>
+        </p:txBody>
+      </p:sp>
+      <p:sp>
+        <p:nvSpPr>
+          <p:cNvPr id="74" name="TextBox 73"/>
+          <p:cNvSpPr txBox="1"/>
+          <p:nvPr/>
+        </p:nvSpPr>
+        <p:spPr>
+          <a:xfrm>
+            <a:off x="5475811" y="1867969"/>
+            <a:ext cx="626052" cy="184666"/>
+          </a:xfrm>
+          <a:prstGeom prst="rect">
+            <a:avLst/>
+          </a:prstGeom>
+          <a:noFill/>
+        </p:spPr>
+        <p:txBody>
+          <a:bodyPr wrap="square" rtlCol="0">
+            <a:spAutoFit/>
+          </a:bodyPr>
+          <a:lstStyle/>
+          <a:p>
+            <a:r>
+              <a:rPr lang="en-US" sz="600" dirty="0" err="1"/>
+              <a:t>nsg</a:t>
+            </a:r>
+            <a:r>
+              <a:rPr lang="en-US" sz="600" dirty="0"/>
+              <a:t>-Bastion </a:t>
+            </a:r>
+          </a:p>
+        </p:txBody>
+      </p:sp>
+      <p:pic>
+        <p:nvPicPr>
+          <p:cNvPr id="75" name="Picture 74"/>
+          <p:cNvPicPr>
+            <a:picLocks noChangeAspect="1"/>
+          </p:cNvPicPr>
+          <p:nvPr/>
+        </p:nvPicPr>
+        <p:blipFill>
+          <a:blip r:embed="rId5"/>
+          <a:stretch>
+            <a:fillRect/>
+          </a:stretch>
+        </p:blipFill>
+        <p:spPr>
+          <a:xfrm>
+            <a:off x="5574685" y="1733451"/>
+            <a:ext cx="288727" cy="238000"/>
+          </a:xfrm>
+          <a:prstGeom prst="rect">
+            <a:avLst/>
+          </a:prstGeom>
+        </p:spPr>
+      </p:pic>
+      <p:pic>
+        <p:nvPicPr>
+          <p:cNvPr id="76" name="Picture 75"/>
+          <p:cNvPicPr>
+            <a:picLocks noChangeAspect="1"/>
+          </p:cNvPicPr>
+          <p:nvPr/>
+        </p:nvPicPr>
+        <p:blipFill>
+          <a:blip r:embed="rId25">
+            <a:extLst>
+              <a:ext uri="{28A0092B-C50C-407E-A947-70E740481C1C}">
+                <a14:useLocalDpi xmlns:a14="http://schemas.microsoft.com/office/drawing/2010/main" val="0"/>
+              </a:ext>
+            </a:extLst>
+          </a:blip>
+          <a:stretch>
+            <a:fillRect/>
+          </a:stretch>
+        </p:blipFill>
+        <p:spPr>
+          <a:xfrm>
+            <a:off x="5019555" y="2063573"/>
+            <a:ext cx="395807" cy="395807"/>
+          </a:xfrm>
+          <a:prstGeom prst="rect">
+            <a:avLst/>
+          </a:prstGeom>
+        </p:spPr>
+      </p:pic>
+      <p:sp>
+        <p:nvSpPr>
+          <p:cNvPr id="77" name="TextBox 76"/>
+          <p:cNvSpPr txBox="1"/>
+          <p:nvPr/>
+        </p:nvSpPr>
+        <p:spPr>
+          <a:xfrm>
+            <a:off x="2989801" y="3317463"/>
+            <a:ext cx="390455" cy="200055"/>
+          </a:xfrm>
+          <a:prstGeom prst="rect">
+            <a:avLst/>
+          </a:prstGeom>
+          <a:noFill/>
+        </p:spPr>
+        <p:txBody>
+          <a:bodyPr wrap="square" rtlCol="0">
+            <a:spAutoFit/>
+          </a:bodyPr>
+          <a:lstStyle/>
+          <a:p>
+            <a:r>
+              <a:rPr lang="en-US" sz="700" dirty="0"/>
+              <a:t>ILB</a:t>
+            </a:r>
+          </a:p>
+        </p:txBody>
+      </p:sp>
+      <p:sp>
+        <p:nvSpPr>
+          <p:cNvPr id="78" name="TextBox 77"/>
+          <p:cNvSpPr txBox="1"/>
+          <p:nvPr/>
+        </p:nvSpPr>
+        <p:spPr>
+          <a:xfrm>
+            <a:off x="4709716" y="1952544"/>
+            <a:ext cx="815294" cy="338554"/>
+          </a:xfrm>
+          <a:prstGeom prst="rect">
+            <a:avLst/>
+          </a:prstGeom>
+          <a:noFill/>
+        </p:spPr>
+        <p:txBody>
+          <a:bodyPr wrap="square" rtlCol="0">
+            <a:spAutoFit/>
+          </a:bodyPr>
+          <a:lstStyle/>
+          <a:p>
+            <a:r>
+              <a:rPr lang="en-US" sz="800" dirty="0"/>
+              <a:t>Bastion Host</a:t>
+            </a:r>
+          </a:p>
+          <a:p>
+            <a:r>
+              <a:rPr lang="en-US" sz="800" dirty="0"/>
+              <a:t>(RDP)</a:t>
+            </a:r>
+          </a:p>
+        </p:txBody>
+      </p:sp>
+      <p:cxnSp>
+        <p:nvCxnSpPr>
+          <p:cNvPr id="79" name="Straight Arrow Connector 78"/>
+          <p:cNvCxnSpPr>
+            <a:cxnSpLocks/>
+            <a:stCxn id="21" idx="3"/>
+            <a:endCxn id="67" idx="1"/>
+          </p:cNvCxnSpPr>
+          <p:nvPr/>
+        </p:nvCxnSpPr>
+        <p:spPr>
+          <a:xfrm flipV="1">
+            <a:off x="5523143" y="2291788"/>
+            <a:ext cx="1690839" cy="1500194"/>
+          </a:xfrm>
+          <a:prstGeom prst="straightConnector1">
+            <a:avLst/>
+          </a:prstGeom>
+          <a:ln>
+            <a:prstDash val="sysDash"/>
+            <a:tailEnd type="triangle"/>
+          </a:ln>
+        </p:spPr>
+        <p:style>
+          <a:lnRef idx="1">
+            <a:schemeClr val="accent1"/>
+          </a:lnRef>
+          <a:fillRef idx="0">
+            <a:schemeClr val="accent1"/>
+          </a:fillRef>
+          <a:effectRef idx="0">
+            <a:schemeClr val="accent1"/>
+          </a:effectRef>
+          <a:fontRef idx="minor">
+            <a:schemeClr val="tx1"/>
+          </a:fontRef>
+        </p:style>
+      </p:cxnSp>
+      <p:cxnSp>
+        <p:nvCxnSpPr>
+          <p:cNvPr id="80" name="Straight Arrow Connector 79"/>
+          <p:cNvCxnSpPr>
+            <a:cxnSpLocks/>
+            <a:stCxn id="73" idx="1"/>
+            <a:endCxn id="16" idx="3"/>
+          </p:cNvCxnSpPr>
+          <p:nvPr/>
+        </p:nvCxnSpPr>
+        <p:spPr>
+          <a:xfrm flipH="1">
+            <a:off x="3837900" y="2360642"/>
+            <a:ext cx="884623" cy="998220"/>
+          </a:xfrm>
+          <a:prstGeom prst="straightConnector1">
+            <a:avLst/>
+          </a:prstGeom>
+          <a:ln>
+            <a:tailEnd type="triangle"/>
+          </a:ln>
+        </p:spPr>
+        <p:style>
+          <a:lnRef idx="1">
+            <a:schemeClr val="accent1"/>
+          </a:lnRef>
+          <a:fillRef idx="0">
+            <a:schemeClr val="accent1"/>
+          </a:fillRef>
+          <a:effectRef idx="0">
+            <a:schemeClr val="accent1"/>
+          </a:effectRef>
+          <a:fontRef idx="minor">
+            <a:schemeClr val="tx1"/>
+          </a:fontRef>
+        </p:style>
+      </p:cxnSp>
+      <p:sp>
+        <p:nvSpPr>
+          <p:cNvPr id="81" name="TextBox 80"/>
+          <p:cNvSpPr txBox="1"/>
+          <p:nvPr/>
+        </p:nvSpPr>
+        <p:spPr>
+          <a:xfrm rot="18696737">
+            <a:off x="4068124" y="2405531"/>
+            <a:ext cx="852423" cy="276999"/>
+          </a:xfrm>
+          <a:prstGeom prst="rect">
+            <a:avLst/>
+          </a:prstGeom>
+          <a:noFill/>
+        </p:spPr>
+        <p:txBody>
+          <a:bodyPr wrap="square" rtlCol="0">
+            <a:spAutoFit/>
+          </a:bodyPr>
+          <a:lstStyle/>
+          <a:p>
+            <a:r>
+              <a:rPr lang="en-US" sz="600" dirty="0"/>
+              <a:t>Access for management</a:t>
+            </a:r>
+          </a:p>
+        </p:txBody>
+      </p:sp>
+      <p:pic>
+        <p:nvPicPr>
+          <p:cNvPr id="82" name="Picture 81"/>
+          <p:cNvPicPr>
+            <a:picLocks noChangeAspect="1"/>
+          </p:cNvPicPr>
+          <p:nvPr/>
+        </p:nvPicPr>
+        <p:blipFill>
+          <a:blip r:embed="rId26">
+            <a:duotone>
+              <a:prstClr val="black"/>
+              <a:schemeClr val="accent6">
+                <a:tint val="45000"/>
+                <a:satMod val="400000"/>
+              </a:schemeClr>
+            </a:duotone>
+            <a:extLst>
+              <a:ext uri="{28A0092B-C50C-407E-A947-70E740481C1C}">
+                <a14:useLocalDpi xmlns:a14="http://schemas.microsoft.com/office/drawing/2010/main" val="0"/>
+              </a:ext>
+            </a:extLst>
+          </a:blip>
+          <a:stretch>
+            <a:fillRect/>
+          </a:stretch>
+        </p:blipFill>
+        <p:spPr>
+          <a:xfrm>
+            <a:off x="2579582" y="3304855"/>
+            <a:ext cx="270270" cy="270270"/>
+          </a:xfrm>
+          <a:prstGeom prst="rect">
+            <a:avLst/>
+          </a:prstGeom>
+        </p:spPr>
+      </p:pic>
+      <p:pic>
+        <p:nvPicPr>
+          <p:cNvPr id="83" name="Picture 82"/>
+          <p:cNvPicPr>
+            <a:picLocks noChangeAspect="1"/>
+          </p:cNvPicPr>
+          <p:nvPr/>
+        </p:nvPicPr>
+        <p:blipFill>
+          <a:blip r:embed="rId26">
+            <a:duotone>
+              <a:prstClr val="black"/>
+              <a:schemeClr val="accent6">
+                <a:tint val="45000"/>
+                <a:satMod val="400000"/>
+              </a:schemeClr>
+            </a:duotone>
+            <a:extLst>
+              <a:ext uri="{28A0092B-C50C-407E-A947-70E740481C1C}">
+                <a14:useLocalDpi xmlns:a14="http://schemas.microsoft.com/office/drawing/2010/main" val="0"/>
+              </a:ext>
+            </a:extLst>
+          </a:blip>
+          <a:stretch>
+            <a:fillRect/>
+          </a:stretch>
+        </p:blipFill>
+        <p:spPr>
+          <a:xfrm>
+            <a:off x="3400970" y="3306116"/>
+            <a:ext cx="270270" cy="270270"/>
+          </a:xfrm>
+          <a:prstGeom prst="rect">
+            <a:avLst/>
+          </a:prstGeom>
+        </p:spPr>
+      </p:pic>
+      <p:sp>
+        <p:nvSpPr>
+          <p:cNvPr id="84" name="TextBox 83"/>
+          <p:cNvSpPr txBox="1"/>
+          <p:nvPr/>
+        </p:nvSpPr>
+        <p:spPr>
+          <a:xfrm>
+            <a:off x="2727059" y="3445346"/>
+            <a:ext cx="388134" cy="184666"/>
+          </a:xfrm>
+          <a:prstGeom prst="rect">
+            <a:avLst/>
+          </a:prstGeom>
+          <a:noFill/>
+        </p:spPr>
+        <p:txBody>
+          <a:bodyPr wrap="square" rtlCol="0">
+            <a:spAutoFit/>
+          </a:bodyPr>
+          <a:lstStyle/>
+          <a:p>
+            <a:r>
+              <a:rPr lang="en-US" sz="600" dirty="0"/>
+              <a:t>Pool 1</a:t>
+            </a:r>
+          </a:p>
+        </p:txBody>
+      </p:sp>
+      <p:sp>
+        <p:nvSpPr>
+          <p:cNvPr id="85" name="TextBox 84"/>
+          <p:cNvSpPr txBox="1"/>
+          <p:nvPr/>
+        </p:nvSpPr>
+        <p:spPr>
+          <a:xfrm>
+            <a:off x="3175158" y="3463667"/>
+            <a:ext cx="388134" cy="184666"/>
+          </a:xfrm>
+          <a:prstGeom prst="rect">
+            <a:avLst/>
+          </a:prstGeom>
+          <a:noFill/>
+        </p:spPr>
+        <p:txBody>
+          <a:bodyPr wrap="square" rtlCol="0">
+            <a:spAutoFit/>
+          </a:bodyPr>
+          <a:lstStyle/>
+          <a:p>
+            <a:r>
+              <a:rPr lang="en-US" sz="600" dirty="0"/>
+              <a:t>Pool 2</a:t>
+            </a:r>
+          </a:p>
+        </p:txBody>
+      </p:sp>
+      <p:cxnSp>
+        <p:nvCxnSpPr>
+          <p:cNvPr id="86" name="Connector: Elbow 85"/>
+          <p:cNvCxnSpPr>
+            <a:cxnSpLocks/>
+            <a:stCxn id="90" idx="1"/>
+            <a:endCxn id="82" idx="0"/>
+          </p:cNvCxnSpPr>
+          <p:nvPr/>
+        </p:nvCxnSpPr>
+        <p:spPr>
+          <a:xfrm rot="10800000" flipV="1">
+            <a:off x="2714720" y="3139757"/>
+            <a:ext cx="198395" cy="165099"/>
+          </a:xfrm>
+          <a:prstGeom prst="bentConnector2">
+            <a:avLst/>
+          </a:prstGeom>
+          <a:ln>
+            <a:solidFill>
+              <a:schemeClr val="accent2"/>
+            </a:solidFill>
+            <a:tailEnd type="triangle"/>
+          </a:ln>
+        </p:spPr>
+        <p:style>
+          <a:lnRef idx="1">
+            <a:schemeClr val="accent1"/>
+          </a:lnRef>
+          <a:fillRef idx="0">
+            <a:schemeClr val="accent1"/>
+          </a:fillRef>
+          <a:effectRef idx="0">
+            <a:schemeClr val="accent1"/>
+          </a:effectRef>
+          <a:fontRef idx="minor">
+            <a:schemeClr val="tx1"/>
+          </a:fontRef>
+        </p:style>
+      </p:cxnSp>
+      <p:cxnSp>
+        <p:nvCxnSpPr>
+          <p:cNvPr id="87" name="Connector: Elbow 86"/>
+          <p:cNvCxnSpPr>
+            <a:cxnSpLocks/>
+            <a:stCxn id="90" idx="3"/>
+            <a:endCxn id="83" idx="0"/>
+          </p:cNvCxnSpPr>
+          <p:nvPr/>
+        </p:nvCxnSpPr>
+        <p:spPr>
+          <a:xfrm>
+            <a:off x="3303257" y="3139756"/>
+            <a:ext cx="232848" cy="166360"/>
+          </a:xfrm>
+          <a:prstGeom prst="bentConnector2">
+            <a:avLst/>
+          </a:prstGeom>
+          <a:ln>
+            <a:tailEnd type="triangle"/>
+          </a:ln>
+        </p:spPr>
+        <p:style>
+          <a:lnRef idx="1">
+            <a:schemeClr val="accent1"/>
+          </a:lnRef>
+          <a:fillRef idx="0">
+            <a:schemeClr val="accent1"/>
+          </a:fillRef>
+          <a:effectRef idx="0">
+            <a:schemeClr val="accent1"/>
+          </a:effectRef>
+          <a:fontRef idx="minor">
+            <a:schemeClr val="tx1"/>
+          </a:fontRef>
+        </p:style>
+      </p:cxnSp>
+      <p:sp>
+        <p:nvSpPr>
+          <p:cNvPr id="88" name="TextBox 87"/>
+          <p:cNvSpPr txBox="1"/>
+          <p:nvPr/>
+        </p:nvSpPr>
+        <p:spPr>
+          <a:xfrm>
+            <a:off x="6240356" y="1990807"/>
+            <a:ext cx="633905" cy="646331"/>
+          </a:xfrm>
+          <a:prstGeom prst="rect">
+            <a:avLst/>
+          </a:prstGeom>
+          <a:noFill/>
+        </p:spPr>
+        <p:txBody>
+          <a:bodyPr wrap="square" rtlCol="0">
+            <a:spAutoFit/>
+          </a:bodyPr>
+          <a:lstStyle/>
+          <a:p>
+            <a:r>
+              <a:rPr lang="en-US" sz="600" b="1" dirty="0" err="1"/>
+              <a:t>Diag</a:t>
+            </a:r>
+            <a:r>
+              <a:rPr lang="en-US" sz="600" b="1" dirty="0"/>
+              <a:t> Logs:</a:t>
+            </a:r>
+          </a:p>
+          <a:p>
+            <a:endParaRPr lang="en-US" sz="600" b="1" dirty="0"/>
+          </a:p>
+          <a:p>
+            <a:r>
+              <a:rPr lang="en-US" sz="600" dirty="0"/>
+              <a:t>N/W,</a:t>
+            </a:r>
+          </a:p>
+          <a:p>
+            <a:r>
+              <a:rPr lang="en-US" sz="600" dirty="0" err="1"/>
+              <a:t>KeyVault</a:t>
+            </a:r>
+            <a:r>
+              <a:rPr lang="en-US" sz="600" dirty="0"/>
+              <a:t>,</a:t>
+            </a:r>
+          </a:p>
+          <a:p>
+            <a:r>
+              <a:rPr lang="en-US" sz="600" dirty="0"/>
+              <a:t>App Gateway,</a:t>
+            </a:r>
+          </a:p>
+          <a:p>
+            <a:r>
+              <a:rPr lang="en-US" sz="600" dirty="0"/>
+              <a:t>ASE, Subnets</a:t>
+            </a:r>
+          </a:p>
+        </p:txBody>
+      </p:sp>
+      <p:cxnSp>
+        <p:nvCxnSpPr>
+          <p:cNvPr id="89" name="Straight Arrow Connector 88"/>
+          <p:cNvCxnSpPr>
+            <a:cxnSpLocks/>
+            <a:endCxn id="63" idx="1"/>
+          </p:cNvCxnSpPr>
+          <p:nvPr/>
+        </p:nvCxnSpPr>
+        <p:spPr>
+          <a:xfrm>
+            <a:off x="6043399" y="2160696"/>
+            <a:ext cx="979578" cy="8467"/>
+          </a:xfrm>
+          <a:prstGeom prst="straightConnector1">
+            <a:avLst/>
+          </a:prstGeom>
+          <a:ln>
+            <a:tailEnd type="triangle"/>
+          </a:ln>
+        </p:spPr>
+        <p:style>
+          <a:lnRef idx="1">
+            <a:schemeClr val="accent1"/>
+          </a:lnRef>
+          <a:fillRef idx="0">
+            <a:schemeClr val="accent1"/>
+          </a:fillRef>
+          <a:effectRef idx="0">
+            <a:schemeClr val="accent1"/>
+          </a:effectRef>
+          <a:fontRef idx="minor">
+            <a:schemeClr val="tx1"/>
+          </a:fontRef>
+        </p:style>
+      </p:cxnSp>
+      <p:pic>
+        <p:nvPicPr>
+          <p:cNvPr id="90" name="Picture 89"/>
+          <p:cNvPicPr>
+            <a:picLocks noChangeAspect="1"/>
+          </p:cNvPicPr>
+          <p:nvPr/>
+        </p:nvPicPr>
+        <p:blipFill>
+          <a:blip r:embed="rId27">
+            <a:extLst>
+              <a:ext uri="{28A0092B-C50C-407E-A947-70E740481C1C}">
+                <a14:useLocalDpi xmlns:a14="http://schemas.microsoft.com/office/drawing/2010/main" val="0"/>
+              </a:ext>
+            </a:extLst>
+          </a:blip>
+          <a:stretch>
+            <a:fillRect/>
+          </a:stretch>
+        </p:blipFill>
+        <p:spPr>
+          <a:xfrm>
+            <a:off x="2913114" y="2944685"/>
+            <a:ext cx="390145" cy="390145"/>
+          </a:xfrm>
+          <a:prstGeom prst="rect">
+            <a:avLst/>
+          </a:prstGeom>
+        </p:spPr>
+      </p:pic>
+      <p:sp>
+        <p:nvSpPr>
+          <p:cNvPr id="91" name="TextBox 90"/>
+          <p:cNvSpPr txBox="1"/>
+          <p:nvPr/>
+        </p:nvSpPr>
+        <p:spPr>
+          <a:xfrm>
+            <a:off x="2318247" y="2601148"/>
+            <a:ext cx="892161" cy="184666"/>
+          </a:xfrm>
+          <a:prstGeom prst="rect">
+            <a:avLst/>
+          </a:prstGeom>
+          <a:noFill/>
+        </p:spPr>
+        <p:txBody>
+          <a:bodyPr wrap="square" rtlCol="0">
+            <a:spAutoFit/>
+          </a:bodyPr>
+          <a:lstStyle/>
+          <a:p>
+            <a:r>
+              <a:rPr lang="en-US" sz="600" dirty="0"/>
+              <a:t>subnet-ASE</a:t>
+            </a:r>
+          </a:p>
+        </p:txBody>
+      </p:sp>
+      <p:sp>
+        <p:nvSpPr>
+          <p:cNvPr id="92" name="TextBox 91"/>
+          <p:cNvSpPr txBox="1"/>
+          <p:nvPr/>
+        </p:nvSpPr>
+        <p:spPr>
+          <a:xfrm>
+            <a:off x="4636631" y="1767815"/>
+            <a:ext cx="892161" cy="184666"/>
+          </a:xfrm>
+          <a:prstGeom prst="rect">
+            <a:avLst/>
+          </a:prstGeom>
+          <a:noFill/>
+        </p:spPr>
+        <p:txBody>
+          <a:bodyPr wrap="square" rtlCol="0">
+            <a:spAutoFit/>
+          </a:bodyPr>
+          <a:lstStyle/>
+          <a:p>
+            <a:r>
+              <a:rPr lang="en-US" sz="600" dirty="0"/>
+              <a:t>subnet-</a:t>
+            </a:r>
+            <a:r>
+              <a:rPr lang="en-US" sz="600" dirty="0" err="1"/>
+              <a:t>bastionhost</a:t>
+            </a:r>
+            <a:endParaRPr lang="en-US" sz="600" dirty="0"/>
+          </a:p>
+        </p:txBody>
+      </p:sp>
+      <p:cxnSp>
+        <p:nvCxnSpPr>
+          <p:cNvPr id="93" name="Straight Connector 92"/>
+          <p:cNvCxnSpPr>
+            <a:cxnSpLocks/>
+            <a:endCxn id="17" idx="1"/>
+          </p:cNvCxnSpPr>
+          <p:nvPr/>
+        </p:nvCxnSpPr>
+        <p:spPr>
+          <a:xfrm flipV="1">
+            <a:off x="1231071" y="3734580"/>
+            <a:ext cx="1367908" cy="10800"/>
+          </a:xfrm>
+          <a:prstGeom prst="line">
+            <a:avLst/>
+          </a:prstGeom>
+          <a:ln>
+            <a:solidFill>
+              <a:srgbClr val="00B050"/>
+            </a:solidFill>
+          </a:ln>
+        </p:spPr>
+        <p:style>
+          <a:lnRef idx="1">
+            <a:schemeClr val="accent1"/>
+          </a:lnRef>
+          <a:fillRef idx="0">
+            <a:schemeClr val="accent1"/>
+          </a:fillRef>
+          <a:effectRef idx="0">
+            <a:schemeClr val="accent1"/>
+          </a:effectRef>
+          <a:fontRef idx="minor">
+            <a:schemeClr val="tx1"/>
+          </a:fontRef>
+        </p:style>
+      </p:cxnSp>
+      <p:pic>
+        <p:nvPicPr>
+          <p:cNvPr id="94" name="Picture 93"/>
+          <p:cNvPicPr>
+            <a:picLocks noChangeAspect="1"/>
+          </p:cNvPicPr>
+          <p:nvPr/>
+        </p:nvPicPr>
+        <p:blipFill>
+          <a:blip r:embed="rId28"/>
+          <a:stretch>
+            <a:fillRect/>
+          </a:stretch>
+        </p:blipFill>
+        <p:spPr>
+          <a:xfrm>
+            <a:off x="968762" y="3647630"/>
+            <a:ext cx="473950" cy="130041"/>
+          </a:xfrm>
+          <a:prstGeom prst="rect">
+            <a:avLst/>
+          </a:prstGeom>
+        </p:spPr>
+      </p:pic>
+      <p:sp>
+        <p:nvSpPr>
+          <p:cNvPr id="95" name="TextBox 94"/>
+          <p:cNvSpPr txBox="1"/>
+          <p:nvPr/>
+        </p:nvSpPr>
+        <p:spPr>
+          <a:xfrm>
+            <a:off x="1427574" y="3591929"/>
+            <a:ext cx="643125" cy="369332"/>
+          </a:xfrm>
+          <a:prstGeom prst="rect">
+            <a:avLst/>
+          </a:prstGeom>
+          <a:noFill/>
+        </p:spPr>
+        <p:txBody>
+          <a:bodyPr wrap="none" rtlCol="0">
+            <a:spAutoFit/>
+          </a:bodyPr>
+          <a:lstStyle/>
+          <a:p>
+            <a:r>
+              <a:rPr lang="en-US" sz="900" dirty="0" err="1"/>
+              <a:t>Webapp</a:t>
+            </a:r>
+            <a:r>
+              <a:rPr lang="en-US" sz="900" dirty="0"/>
+              <a:t> </a:t>
+            </a:r>
+          </a:p>
+          <a:p>
+            <a:r>
+              <a:rPr lang="en-US" sz="900" dirty="0"/>
+              <a:t>extension</a:t>
+            </a:r>
+          </a:p>
+        </p:txBody>
+      </p:sp>
+      <p:pic>
+        <p:nvPicPr>
+          <p:cNvPr id="96" name="Picture 2" descr="http://www.onesupport.com/wp-content/uploads/2015/08/Windows-Defender.jpeg"/>
+          <p:cNvPicPr>
+            <a:picLocks noChangeAspect="1" noChangeArrowheads="1"/>
+          </p:cNvPicPr>
+          <p:nvPr/>
+        </p:nvPicPr>
+        <p:blipFill>
+          <a:blip r:embed="rId29">
+            <a:extLst>
+              <a:ext uri="{BEBA8EAE-BF5A-486C-A8C5-ECC9F3942E4B}">
+                <a14:imgProps xmlns:a14="http://schemas.microsoft.com/office/drawing/2010/main">
+                  <a14:imgLayer r:embed="rId30">
+                    <a14:imgEffect>
+                      <a14:backgroundRemoval t="10000" b="90000" l="10000" r="90000"/>
+                    </a14:imgEffect>
+                  </a14:imgLayer>
+                </a14:imgProps>
+              </a:ext>
+              <a:ext uri="{28A0092B-C50C-407E-A947-70E740481C1C}">
+                <a14:useLocalDpi xmlns:a14="http://schemas.microsoft.com/office/drawing/2010/main" val="0"/>
+              </a:ext>
+            </a:extLst>
+          </a:blip>
+          <a:srcRect/>
+          <a:stretch>
+            <a:fillRect/>
+          </a:stretch>
+        </p:blipFill>
+        <p:spPr bwMode="auto">
+          <a:xfrm>
+            <a:off x="4738970" y="2414293"/>
+            <a:ext cx="237075" cy="220805"/>
+          </a:xfrm>
+          <a:prstGeom prst="rect">
+            <a:avLst/>
+          </a:prstGeom>
+          <a:noFill/>
+          <a:extLst>
+            <a:ext uri="{909E8E84-426E-40DD-AFC4-6F175D3DCCD1}">
+              <a14:hiddenFill xmlns:a14="http://schemas.microsoft.com/office/drawing/2010/main">
+                <a:solidFill>
+                  <a:srgbClr val="FFFFFF"/>
+                </a:solidFill>
+              </a14:hiddenFill>
+            </a:ext>
+          </a:extLst>
+        </p:spPr>
+      </p:pic>
+      <p:sp>
+        <p:nvSpPr>
+          <p:cNvPr id="97" name="TextBox 96"/>
+          <p:cNvSpPr txBox="1"/>
+          <p:nvPr/>
+        </p:nvSpPr>
+        <p:spPr>
+          <a:xfrm>
+            <a:off x="4878664" y="2453420"/>
+            <a:ext cx="815294" cy="276999"/>
+          </a:xfrm>
+          <a:prstGeom prst="rect">
+            <a:avLst/>
+          </a:prstGeom>
+          <a:noFill/>
+        </p:spPr>
+        <p:txBody>
+          <a:bodyPr wrap="square" rtlCol="0">
+            <a:spAutoFit/>
+          </a:bodyPr>
+          <a:lstStyle/>
+          <a:p>
+            <a:r>
+              <a:rPr lang="en-US" sz="600" dirty="0"/>
+              <a:t>Antimalware extension </a:t>
+            </a:r>
+          </a:p>
+        </p:txBody>
+      </p:sp>
+      <p:cxnSp>
+        <p:nvCxnSpPr>
+          <p:cNvPr id="98" name="Straight Connector 97"/>
+          <p:cNvCxnSpPr>
+            <a:cxnSpLocks/>
+            <a:endCxn id="73" idx="0"/>
+          </p:cNvCxnSpPr>
+          <p:nvPr/>
+        </p:nvCxnSpPr>
+        <p:spPr>
+          <a:xfrm flipH="1">
+            <a:off x="5263678" y="860116"/>
+            <a:ext cx="11145" cy="1024052"/>
+          </a:xfrm>
+          <a:prstGeom prst="line">
+            <a:avLst/>
+          </a:prstGeom>
+          <a:ln>
+            <a:headEnd type="diamond" w="med" len="med"/>
+            <a:tailEnd type="triangle" w="med" len="med"/>
+          </a:ln>
+        </p:spPr>
+        <p:style>
+          <a:lnRef idx="1">
+            <a:schemeClr val="accent1"/>
+          </a:lnRef>
+          <a:fillRef idx="0">
+            <a:schemeClr val="accent1"/>
+          </a:fillRef>
+          <a:effectRef idx="0">
+            <a:schemeClr val="accent1"/>
+          </a:effectRef>
+          <a:fontRef idx="minor">
+            <a:schemeClr val="tx1"/>
+          </a:fontRef>
+        </p:style>
+      </p:cxnSp>
+      <p:pic>
+        <p:nvPicPr>
+          <p:cNvPr id="99" name="Picture 98" descr="multiple user icons different colors - vector Clip Art"/>
+          <p:cNvPicPr>
+            <a:picLocks noChangeAspect="1"/>
+          </p:cNvPicPr>
+          <p:nvPr/>
+        </p:nvPicPr>
+        <p:blipFill>
+          <a:blip r:embed="rId18">
+            <a:extLst>
+              <a:ext uri="{28A0092B-C50C-407E-A947-70E740481C1C}">
+                <a14:useLocalDpi xmlns:a14="http://schemas.microsoft.com/office/drawing/2010/main" val="0"/>
+              </a:ext>
+            </a:extLst>
+          </a:blip>
+          <a:stretch>
+            <a:fillRect/>
+          </a:stretch>
+        </p:blipFill>
+        <p:spPr>
+          <a:xfrm>
+            <a:off x="5186770" y="412290"/>
+            <a:ext cx="225000" cy="241875"/>
+          </a:xfrm>
+          <a:prstGeom prst="rect">
+            <a:avLst/>
+          </a:prstGeom>
+        </p:spPr>
+      </p:pic>
+      <p:sp>
+        <p:nvSpPr>
+          <p:cNvPr id="100" name="TextBox 99"/>
+          <p:cNvSpPr txBox="1"/>
+          <p:nvPr/>
+        </p:nvSpPr>
+        <p:spPr>
+          <a:xfrm>
+            <a:off x="5361724" y="570138"/>
+            <a:ext cx="965533" cy="507831"/>
+          </a:xfrm>
+          <a:prstGeom prst="rect">
+            <a:avLst/>
+          </a:prstGeom>
+          <a:noFill/>
+        </p:spPr>
+        <p:txBody>
+          <a:bodyPr wrap="square" rtlCol="0">
+            <a:spAutoFit/>
+          </a:bodyPr>
+          <a:lstStyle/>
+          <a:p>
+            <a:r>
+              <a:rPr lang="en-US" sz="900" dirty="0"/>
+              <a:t>DevOps Releases/ Management</a:t>
+            </a:r>
+          </a:p>
+        </p:txBody>
+      </p:sp>
+      <p:sp>
+        <p:nvSpPr>
+          <p:cNvPr id="101" name="TextBox 100"/>
+          <p:cNvSpPr txBox="1"/>
+          <p:nvPr/>
+        </p:nvSpPr>
+        <p:spPr>
+          <a:xfrm>
+            <a:off x="3127074" y="1532676"/>
+            <a:ext cx="780983" cy="461665"/>
+          </a:xfrm>
+          <a:prstGeom prst="rect">
+            <a:avLst/>
+          </a:prstGeom>
+          <a:noFill/>
+        </p:spPr>
+        <p:txBody>
+          <a:bodyPr wrap="none" rtlCol="0">
+            <a:spAutoFit/>
+          </a:bodyPr>
+          <a:lstStyle/>
+          <a:p>
+            <a:r>
+              <a:rPr lang="en-US" sz="2400" dirty="0">
+                <a:solidFill>
+                  <a:schemeClr val="bg1">
+                    <a:lumMod val="65000"/>
+                  </a:schemeClr>
+                </a:solidFill>
+              </a:rPr>
+              <a:t>DMZ</a:t>
+            </a:r>
+          </a:p>
+        </p:txBody>
+      </p:sp>
+      <p:sp>
+        <p:nvSpPr>
+          <p:cNvPr id="102" name="Rectangle 101"/>
+          <p:cNvSpPr/>
+          <p:nvPr/>
+        </p:nvSpPr>
+        <p:spPr>
+          <a:xfrm>
+            <a:off x="7833489" y="1514836"/>
+            <a:ext cx="1127919" cy="738664"/>
+          </a:xfrm>
+          <a:prstGeom prst="rect">
+            <a:avLst/>
+          </a:prstGeom>
+        </p:spPr>
+        <p:txBody>
+          <a:bodyPr wrap="square">
+            <a:spAutoFit/>
+          </a:bodyPr>
+          <a:lstStyle/>
+          <a:p>
+            <a:r>
+              <a:rPr lang="en-US" sz="600" b="1" dirty="0"/>
+              <a:t>OMS Solutions</a:t>
+            </a:r>
+          </a:p>
+          <a:p>
+            <a:pPr>
+              <a:buFont typeface="+mj-lt"/>
+              <a:buAutoNum type="arabicPeriod"/>
+            </a:pPr>
+            <a:r>
+              <a:rPr lang="en-US" sz="600" dirty="0"/>
+              <a:t>Activity Log Analytics</a:t>
+            </a:r>
+          </a:p>
+          <a:p>
+            <a:pPr>
+              <a:buFont typeface="+mj-lt"/>
+              <a:buAutoNum type="arabicPeriod"/>
+            </a:pPr>
+            <a:r>
+              <a:rPr lang="en-US" sz="600" dirty="0"/>
+              <a:t>Azure Networking Analytics</a:t>
+            </a:r>
+          </a:p>
+          <a:p>
+            <a:pPr>
+              <a:buFont typeface="+mj-lt"/>
+              <a:buAutoNum type="arabicPeriod"/>
+            </a:pPr>
+            <a:r>
+              <a:rPr lang="en-US" sz="600" dirty="0"/>
+              <a:t>Azure SQL Analytics</a:t>
+            </a:r>
+          </a:p>
+          <a:p>
+            <a:pPr>
+              <a:buFont typeface="+mj-lt"/>
+              <a:buAutoNum type="arabicPeriod"/>
+            </a:pPr>
+            <a:r>
+              <a:rPr lang="en-US" sz="600" dirty="0"/>
+              <a:t>Change Tracking</a:t>
+            </a:r>
+          </a:p>
+          <a:p>
+            <a:pPr>
+              <a:buFont typeface="+mj-lt"/>
+              <a:buAutoNum type="arabicPeriod"/>
+            </a:pPr>
+            <a:r>
+              <a:rPr lang="en-US" sz="600" dirty="0"/>
+              <a:t>Key Vault Analytics</a:t>
+            </a:r>
+          </a:p>
+          <a:p>
+            <a:pPr>
+              <a:buFont typeface="+mj-lt"/>
+              <a:buAutoNum type="arabicPeriod"/>
+            </a:pPr>
+            <a:r>
+              <a:rPr lang="en-US" sz="600" dirty="0"/>
+              <a:t>Service Map</a:t>
+            </a:r>
+          </a:p>
+        </p:txBody>
+      </p:sp>
+      <p:pic>
+        <p:nvPicPr>
+          <p:cNvPr id="103" name="Picture 102"/>
+          <p:cNvPicPr>
+            <a:picLocks noChangeAspect="1"/>
+          </p:cNvPicPr>
+          <p:nvPr/>
+        </p:nvPicPr>
+        <p:blipFill>
+          <a:blip r:embed="rId14">
+            <a:extLst>
+              <a:ext uri="{28A0092B-C50C-407E-A947-70E740481C1C}">
+                <a14:useLocalDpi xmlns:a14="http://schemas.microsoft.com/office/drawing/2010/main" val="0"/>
+              </a:ext>
+            </a:extLst>
+          </a:blip>
+          <a:stretch>
+            <a:fillRect/>
+          </a:stretch>
+        </p:blipFill>
+        <p:spPr>
+          <a:xfrm>
+            <a:off x="7903590" y="3161240"/>
+            <a:ext cx="337054" cy="337054"/>
+          </a:xfrm>
+          <a:prstGeom prst="rect">
+            <a:avLst/>
+          </a:prstGeom>
+        </p:spPr>
+      </p:pic>
+      <p:sp>
+        <p:nvSpPr>
+          <p:cNvPr id="104" name="TextBox 103"/>
+          <p:cNvSpPr txBox="1"/>
+          <p:nvPr/>
+        </p:nvSpPr>
+        <p:spPr>
+          <a:xfrm>
+            <a:off x="7786909" y="3473484"/>
+            <a:ext cx="636756" cy="307777"/>
+          </a:xfrm>
+          <a:prstGeom prst="rect">
+            <a:avLst/>
+          </a:prstGeom>
+          <a:noFill/>
+        </p:spPr>
+        <p:txBody>
+          <a:bodyPr wrap="square" rtlCol="0">
+            <a:spAutoFit/>
+          </a:bodyPr>
+          <a:lstStyle/>
+          <a:p>
+            <a:r>
+              <a:rPr lang="en-US" sz="700" dirty="0"/>
+              <a:t>Secured by AD</a:t>
+            </a:r>
+          </a:p>
+        </p:txBody>
+      </p:sp>
+      <p:sp>
+        <p:nvSpPr>
+          <p:cNvPr id="105" name="TextBox 104"/>
+          <p:cNvSpPr txBox="1"/>
+          <p:nvPr/>
+        </p:nvSpPr>
+        <p:spPr>
+          <a:xfrm>
+            <a:off x="4808115" y="4789989"/>
+            <a:ext cx="636756" cy="200055"/>
+          </a:xfrm>
+          <a:prstGeom prst="rect">
+            <a:avLst/>
+          </a:prstGeom>
+          <a:noFill/>
+        </p:spPr>
+        <p:txBody>
+          <a:bodyPr wrap="square" rtlCol="0">
+            <a:spAutoFit/>
+          </a:bodyPr>
+          <a:lstStyle/>
+          <a:p>
+            <a:r>
+              <a:rPr lang="en-US" sz="700" dirty="0"/>
+              <a:t>RBAC</a:t>
+            </a:r>
+          </a:p>
+        </p:txBody>
+      </p:sp>
+      <p:sp>
+        <p:nvSpPr>
+          <p:cNvPr id="106" name="TextBox 105"/>
+          <p:cNvSpPr txBox="1"/>
+          <p:nvPr/>
+        </p:nvSpPr>
+        <p:spPr>
+          <a:xfrm>
+            <a:off x="4427740" y="4989463"/>
+            <a:ext cx="636756" cy="200055"/>
+          </a:xfrm>
+          <a:prstGeom prst="rect">
+            <a:avLst/>
+          </a:prstGeom>
+          <a:noFill/>
+        </p:spPr>
+        <p:txBody>
+          <a:bodyPr wrap="square" rtlCol="0">
+            <a:spAutoFit/>
+          </a:bodyPr>
+          <a:lstStyle/>
+          <a:p>
+            <a:r>
+              <a:rPr lang="en-US" sz="700" dirty="0"/>
+              <a:t>Staff AAD</a:t>
+            </a:r>
+          </a:p>
+        </p:txBody>
+      </p:sp>
+      <p:sp>
+        <p:nvSpPr>
+          <p:cNvPr id="107" name="TextBox 106"/>
+          <p:cNvSpPr txBox="1"/>
+          <p:nvPr/>
+        </p:nvSpPr>
+        <p:spPr>
+          <a:xfrm>
+            <a:off x="6204928" y="4989463"/>
+            <a:ext cx="1008039" cy="200055"/>
+          </a:xfrm>
+          <a:prstGeom prst="rect">
+            <a:avLst/>
+          </a:prstGeom>
+          <a:noFill/>
+        </p:spPr>
+        <p:txBody>
+          <a:bodyPr wrap="square" rtlCol="0">
+            <a:spAutoFit/>
+          </a:bodyPr>
+          <a:lstStyle/>
+          <a:p>
+            <a:r>
+              <a:rPr lang="en-US" sz="700" dirty="0"/>
+              <a:t>Azure Security Center</a:t>
+            </a:r>
+          </a:p>
+        </p:txBody>
+      </p:sp>
+      <p:sp>
+        <p:nvSpPr>
+          <p:cNvPr id="108" name="TextBox 107"/>
+          <p:cNvSpPr txBox="1"/>
+          <p:nvPr/>
+        </p:nvSpPr>
+        <p:spPr>
+          <a:xfrm>
+            <a:off x="4864043" y="2658467"/>
+            <a:ext cx="815294" cy="184666"/>
+          </a:xfrm>
+          <a:prstGeom prst="rect">
+            <a:avLst/>
+          </a:prstGeom>
+          <a:noFill/>
+        </p:spPr>
+        <p:txBody>
+          <a:bodyPr wrap="square" rtlCol="0">
+            <a:spAutoFit/>
+          </a:bodyPr>
+          <a:lstStyle/>
+          <a:p>
+            <a:r>
+              <a:rPr lang="en-US" sz="600" dirty="0"/>
+              <a:t>OMS extension </a:t>
+            </a:r>
+          </a:p>
+        </p:txBody>
+      </p:sp>
+      <p:pic>
+        <p:nvPicPr>
+          <p:cNvPr id="109" name="Picture 108"/>
+          <p:cNvPicPr>
+            <a:picLocks noChangeAspect="1"/>
+          </p:cNvPicPr>
+          <p:nvPr/>
+        </p:nvPicPr>
+        <p:blipFill>
+          <a:blip r:embed="rId22">
+            <a:extLst>
+              <a:ext uri="{28A0092B-C50C-407E-A947-70E740481C1C}">
+                <a14:useLocalDpi xmlns:a14="http://schemas.microsoft.com/office/drawing/2010/main" val="0"/>
+              </a:ext>
+            </a:extLst>
+          </a:blip>
+          <a:stretch>
+            <a:fillRect/>
+          </a:stretch>
+        </p:blipFill>
+        <p:spPr>
+          <a:xfrm>
+            <a:off x="4781175" y="2646524"/>
+            <a:ext cx="148721" cy="148721"/>
+          </a:xfrm>
+          <a:prstGeom prst="rect">
+            <a:avLst/>
+          </a:prstGeom>
+        </p:spPr>
+      </p:pic>
+      <p:sp>
+        <p:nvSpPr>
+          <p:cNvPr id="110" name="TextBox 109"/>
+          <p:cNvSpPr txBox="1"/>
+          <p:nvPr/>
+        </p:nvSpPr>
+        <p:spPr>
+          <a:xfrm>
+            <a:off x="3042133" y="1053651"/>
+            <a:ext cx="1324283" cy="276999"/>
+          </a:xfrm>
+          <a:prstGeom prst="rect">
+            <a:avLst/>
+          </a:prstGeom>
+          <a:noFill/>
+        </p:spPr>
+        <p:txBody>
+          <a:bodyPr wrap="square" rtlCol="0">
+            <a:spAutoFit/>
+          </a:bodyPr>
+          <a:lstStyle/>
+          <a:p>
+            <a:r>
+              <a:rPr lang="en-US" sz="600" b="1" dirty="0"/>
+              <a:t>Custom Domain:</a:t>
+            </a:r>
+          </a:p>
+          <a:p>
+            <a:r>
+              <a:rPr lang="en-US" sz="600" dirty="0">
+                <a:hlinkClick r:id="rId31"/>
+              </a:rPr>
+              <a:t>https://www.azurepcisamples.com</a:t>
+            </a:r>
+            <a:r>
+              <a:rPr lang="en-US" sz="600" dirty="0"/>
+              <a:t> </a:t>
+            </a:r>
+          </a:p>
+        </p:txBody>
+      </p:sp>
+      <p:cxnSp>
+        <p:nvCxnSpPr>
+          <p:cNvPr id="111" name="Straight Arrow Connector 110"/>
+          <p:cNvCxnSpPr>
+            <a:cxnSpLocks/>
+            <a:stCxn id="50" idx="0"/>
+          </p:cNvCxnSpPr>
+          <p:nvPr/>
+        </p:nvCxnSpPr>
+        <p:spPr>
+          <a:xfrm flipH="1">
+            <a:off x="699565" y="607138"/>
+            <a:ext cx="2104512" cy="3120"/>
+          </a:xfrm>
+          <a:prstGeom prst="straightConnector1">
+            <a:avLst/>
+          </a:prstGeom>
+          <a:ln w="19050">
+            <a:prstDash val="sysDash"/>
+            <a:tailEnd type="triangle"/>
+          </a:ln>
+        </p:spPr>
+        <p:style>
+          <a:lnRef idx="1">
+            <a:schemeClr val="accent1"/>
+          </a:lnRef>
+          <a:fillRef idx="0">
+            <a:schemeClr val="accent1"/>
+          </a:fillRef>
+          <a:effectRef idx="0">
+            <a:schemeClr val="accent1"/>
+          </a:effectRef>
+          <a:fontRef idx="minor">
+            <a:schemeClr val="tx1"/>
+          </a:fontRef>
+        </p:style>
+      </p:cxnSp>
+      <p:sp>
+        <p:nvSpPr>
+          <p:cNvPr id="112" name="TextBox 111"/>
+          <p:cNvSpPr txBox="1"/>
+          <p:nvPr/>
+        </p:nvSpPr>
+        <p:spPr>
+          <a:xfrm>
+            <a:off x="1630791" y="444277"/>
+            <a:ext cx="690260" cy="369332"/>
+          </a:xfrm>
+          <a:prstGeom prst="rect">
+            <a:avLst/>
+          </a:prstGeom>
+          <a:noFill/>
+        </p:spPr>
+        <p:txBody>
+          <a:bodyPr wrap="square" rtlCol="0">
+            <a:spAutoFit/>
+          </a:bodyPr>
+          <a:lstStyle/>
+          <a:p>
+            <a:r>
+              <a:rPr lang="en-US" sz="900" b="1" dirty="0"/>
+              <a:t>DNS lookup</a:t>
+            </a:r>
+            <a:endParaRPr lang="en-US" sz="900" dirty="0"/>
+          </a:p>
+        </p:txBody>
+      </p:sp>
+      <p:cxnSp>
+        <p:nvCxnSpPr>
+          <p:cNvPr id="115" name="Straight Arrow Connector 114"/>
+          <p:cNvCxnSpPr>
+            <a:cxnSpLocks/>
+          </p:cNvCxnSpPr>
+          <p:nvPr/>
+        </p:nvCxnSpPr>
+        <p:spPr>
+          <a:xfrm flipH="1">
+            <a:off x="5562244" y="3559422"/>
+            <a:ext cx="1784360" cy="311614"/>
+          </a:xfrm>
+          <a:prstGeom prst="straightConnector1">
+            <a:avLst/>
+          </a:prstGeom>
+          <a:ln>
+            <a:prstDash val="dashDot"/>
+            <a:tailEnd type="triangle"/>
+          </a:ln>
+        </p:spPr>
+        <p:style>
+          <a:lnRef idx="1">
+            <a:schemeClr val="accent1"/>
+          </a:lnRef>
+          <a:fillRef idx="0">
+            <a:schemeClr val="accent1"/>
+          </a:fillRef>
+          <a:effectRef idx="0">
+            <a:schemeClr val="accent1"/>
+          </a:effectRef>
+          <a:fontRef idx="minor">
+            <a:schemeClr val="tx1"/>
+          </a:fontRef>
+        </p:style>
+      </p:cxnSp>
+      <p:sp>
+        <p:nvSpPr>
+          <p:cNvPr id="118" name="TextBox 117"/>
+          <p:cNvSpPr txBox="1"/>
+          <p:nvPr/>
+        </p:nvSpPr>
+        <p:spPr>
+          <a:xfrm rot="20948144">
+            <a:off x="6052077" y="3523886"/>
+            <a:ext cx="852423" cy="200055"/>
+          </a:xfrm>
+          <a:prstGeom prst="rect">
+            <a:avLst/>
+          </a:prstGeom>
+          <a:noFill/>
+        </p:spPr>
+        <p:txBody>
+          <a:bodyPr wrap="square" rtlCol="0">
+            <a:spAutoFit/>
+          </a:bodyPr>
+          <a:lstStyle/>
+          <a:p>
+            <a:r>
+              <a:rPr lang="en-US" sz="700" dirty="0"/>
+              <a:t>Collect metrics</a:t>
+            </a:r>
+          </a:p>
+        </p:txBody>
+      </p:sp>
+      <p:sp>
+        <p:nvSpPr>
+          <p:cNvPr id="119" name="TextBox 118"/>
+          <p:cNvSpPr txBox="1"/>
+          <p:nvPr/>
+        </p:nvSpPr>
+        <p:spPr>
+          <a:xfrm>
+            <a:off x="4146095" y="3622397"/>
+            <a:ext cx="852423" cy="200055"/>
+          </a:xfrm>
+          <a:prstGeom prst="rect">
+            <a:avLst/>
+          </a:prstGeom>
+          <a:noFill/>
+        </p:spPr>
+        <p:txBody>
+          <a:bodyPr wrap="square" rtlCol="0">
+            <a:spAutoFit/>
+          </a:bodyPr>
+          <a:lstStyle/>
+          <a:p>
+            <a:r>
+              <a:rPr lang="en-US" sz="700" dirty="0"/>
+              <a:t>Collect metrics</a:t>
+            </a:r>
+          </a:p>
+        </p:txBody>
+      </p:sp>
+    </p:spTree>
+    <p:extLst>
+      <p:ext uri="{BB962C8B-B14F-4D97-AF65-F5344CB8AC3E}">
+        <p14:creationId xmlns:p14="http://schemas.microsoft.com/office/powerpoint/2010/main" val="3998706706"/>
       </p:ext>
     </p:extLst>
   </p:cSld>
@@ -8105,7 +11906,7 @@
           </a:ln>
           <a:extLst>
             <a:ext uri="{91240B29-F687-4f45-9708-019B960494DF}">
-              <a14:hiddenLine xmlns="" xmlns:a14="http://schemas.microsoft.com/office/drawing/2010/main" w="9525">
+              <a14:hiddenLine xmlns:a14="http://schemas.microsoft.com/office/drawing/2010/main" xmlns="" w="9525">
                 <a:solidFill>
                   <a:srgbClr val="000000"/>
                 </a:solidFill>

</xml_diff>